<commit_message>
Präsentation angepasst, inkl. englischen Folien für Challenge und Idee
</commit_message>
<xml_diff>
--- a/Presentation/Bonsai-Pitch-Hackathon2025.pptx
+++ b/Presentation/Bonsai-Pitch-Hackathon2025.pptx
@@ -5,20 +5,22 @@
     <p:sldMasterId id="2147483648" r:id="rId1"/>
   </p:sldMasterIdLst>
   <p:notesMasterIdLst>
-    <p:notesMasterId r:id="rId13"/>
+    <p:notesMasterId r:id="rId15"/>
   </p:notesMasterIdLst>
   <p:sldIdLst>
     <p:sldId id="258" r:id="rId2"/>
     <p:sldId id="259" r:id="rId3"/>
     <p:sldId id="260" r:id="rId4"/>
     <p:sldId id="262" r:id="rId5"/>
-    <p:sldId id="263" r:id="rId6"/>
-    <p:sldId id="264" r:id="rId7"/>
-    <p:sldId id="267" r:id="rId8"/>
-    <p:sldId id="269" r:id="rId9"/>
-    <p:sldId id="268" r:id="rId10"/>
-    <p:sldId id="265" r:id="rId11"/>
-    <p:sldId id="266" r:id="rId12"/>
+    <p:sldId id="271" r:id="rId6"/>
+    <p:sldId id="263" r:id="rId7"/>
+    <p:sldId id="270" r:id="rId8"/>
+    <p:sldId id="264" r:id="rId9"/>
+    <p:sldId id="267" r:id="rId10"/>
+    <p:sldId id="269" r:id="rId11"/>
+    <p:sldId id="268" r:id="rId12"/>
+    <p:sldId id="265" r:id="rId13"/>
+    <p:sldId id="266" r:id="rId14"/>
   </p:sldIdLst>
   <p:sldSz cx="12192000" cy="6858000"/>
   <p:notesSz cx="6858000" cy="9144000"/>
@@ -207,7 +209,7 @@
           <a:p>
             <a:fld id="{7CC45DE0-F644-4D74-8464-7E9720E021B8}" type="datetimeFigureOut">
               <a:rPr lang="de-DE" smtClean="0"/>
-              <a:t>23.09.2025</a:t>
+              <a:t>30.09.2025</a:t>
             </a:fld>
             <a:endParaRPr lang="de-DE"/>
           </a:p>
@@ -539,7 +541,7 @@
           <a:p>
             <a:fld id="{458A7E8C-898C-4771-A96C-641A15F9FBDA}" type="slidenum">
               <a:rPr lang="de-DE" smtClean="0"/>
-              <a:t>5</a:t>
+              <a:t>6</a:t>
             </a:fld>
             <a:endParaRPr lang="de-DE"/>
           </a:p>
@@ -559,6 +561,114 @@
 </file>
 
 <file path=ppt/notesSlides/notesSlide2.xml><?xml version="1.0" encoding="utf-8"?>
+<p:notes xmlns:a="http://schemas.openxmlformats.org/drawingml/2006/main" xmlns:r="http://schemas.openxmlformats.org/officeDocument/2006/relationships" xmlns:p="http://schemas.openxmlformats.org/presentationml/2006/main">
+  <p:cSld>
+    <p:spTree>
+      <p:nvGrpSpPr>
+        <p:cNvPr id="1" name="">
+          <a:extLst>
+            <a:ext uri="{FF2B5EF4-FFF2-40B4-BE49-F238E27FC236}">
+              <a16:creationId xmlns:a16="http://schemas.microsoft.com/office/drawing/2014/main" id="{41CE28D9-7B5C-CAA0-271D-CF6D7C021B5A}"/>
+            </a:ext>
+          </a:extLst>
+        </p:cNvPr>
+        <p:cNvGrpSpPr/>
+        <p:nvPr/>
+      </p:nvGrpSpPr>
+      <p:grpSpPr>
+        <a:xfrm>
+          <a:off x="0" y="0"/>
+          <a:ext cx="0" cy="0"/>
+          <a:chOff x="0" y="0"/>
+          <a:chExt cx="0" cy="0"/>
+        </a:xfrm>
+      </p:grpSpPr>
+      <p:sp>
+        <p:nvSpPr>
+          <p:cNvPr id="2" name="Folienbildplatzhalter 1">
+            <a:extLst>
+              <a:ext uri="{FF2B5EF4-FFF2-40B4-BE49-F238E27FC236}">
+                <a16:creationId xmlns:a16="http://schemas.microsoft.com/office/drawing/2014/main" id="{B11AD833-5CF7-AF99-9535-15FEECEB6E86}"/>
+              </a:ext>
+            </a:extLst>
+          </p:cNvPr>
+          <p:cNvSpPr>
+            <a:spLocks noGrp="1" noRot="1" noChangeAspect="1"/>
+          </p:cNvSpPr>
+          <p:nvPr>
+            <p:ph type="sldImg"/>
+          </p:nvPr>
+        </p:nvSpPr>
+        <p:spPr/>
+      </p:sp>
+      <p:sp>
+        <p:nvSpPr>
+          <p:cNvPr id="3" name="Notizenplatzhalter 2">
+            <a:extLst>
+              <a:ext uri="{FF2B5EF4-FFF2-40B4-BE49-F238E27FC236}">
+                <a16:creationId xmlns:a16="http://schemas.microsoft.com/office/drawing/2014/main" id="{BEE556E7-5123-96F8-DE84-9863062628BA}"/>
+              </a:ext>
+            </a:extLst>
+          </p:cNvPr>
+          <p:cNvSpPr>
+            <a:spLocks noGrp="1"/>
+          </p:cNvSpPr>
+          <p:nvPr>
+            <p:ph type="body" idx="1"/>
+          </p:nvPr>
+        </p:nvSpPr>
+        <p:spPr/>
+        <p:txBody>
+          <a:bodyPr/>
+          <a:lstStyle/>
+          <a:p>
+            <a:endParaRPr lang="de-DE"/>
+          </a:p>
+        </p:txBody>
+      </p:sp>
+      <p:sp>
+        <p:nvSpPr>
+          <p:cNvPr id="4" name="Foliennummernplatzhalter 3">
+            <a:extLst>
+              <a:ext uri="{FF2B5EF4-FFF2-40B4-BE49-F238E27FC236}">
+                <a16:creationId xmlns:a16="http://schemas.microsoft.com/office/drawing/2014/main" id="{0E787415-CB68-2D4B-3EED-DBC797024534}"/>
+              </a:ext>
+            </a:extLst>
+          </p:cNvPr>
+          <p:cNvSpPr>
+            <a:spLocks noGrp="1"/>
+          </p:cNvSpPr>
+          <p:nvPr>
+            <p:ph type="sldNum" sz="quarter" idx="5"/>
+          </p:nvPr>
+        </p:nvSpPr>
+        <p:spPr/>
+        <p:txBody>
+          <a:bodyPr/>
+          <a:lstStyle/>
+          <a:p>
+            <a:fld id="{458A7E8C-898C-4771-A96C-641A15F9FBDA}" type="slidenum">
+              <a:rPr lang="de-DE" smtClean="0"/>
+              <a:t>7</a:t>
+            </a:fld>
+            <a:endParaRPr lang="de-DE"/>
+          </a:p>
+        </p:txBody>
+      </p:sp>
+    </p:spTree>
+    <p:extLst>
+      <p:ext uri="{BB962C8B-B14F-4D97-AF65-F5344CB8AC3E}">
+        <p14:creationId xmlns:p14="http://schemas.microsoft.com/office/powerpoint/2010/main" val="547504078"/>
+      </p:ext>
+    </p:extLst>
+  </p:cSld>
+  <p:clrMapOvr>
+    <a:masterClrMapping/>
+  </p:clrMapOvr>
+</p:notes>
+</file>
+
+<file path=ppt/notesSlides/notesSlide3.xml><?xml version="1.0" encoding="utf-8"?>
 <p:notes xmlns:a="http://schemas.openxmlformats.org/drawingml/2006/main" xmlns:r="http://schemas.openxmlformats.org/officeDocument/2006/relationships" xmlns:p="http://schemas.openxmlformats.org/presentationml/2006/main">
   <p:cSld>
     <p:spTree>
@@ -647,7 +757,7 @@
           <a:p>
             <a:fld id="{458A7E8C-898C-4771-A96C-641A15F9FBDA}" type="slidenum">
               <a:rPr lang="de-DE" smtClean="0"/>
-              <a:t>6</a:t>
+              <a:t>8</a:t>
             </a:fld>
             <a:endParaRPr lang="de-DE"/>
           </a:p>
@@ -666,7 +776,7 @@
 </p:notes>
 </file>
 
-<file path=ppt/notesSlides/notesSlide3.xml><?xml version="1.0" encoding="utf-8"?>
+<file path=ppt/notesSlides/notesSlide4.xml><?xml version="1.0" encoding="utf-8"?>
 <p:notes xmlns:a="http://schemas.openxmlformats.org/drawingml/2006/main" xmlns:r="http://schemas.openxmlformats.org/officeDocument/2006/relationships" xmlns:p="http://schemas.openxmlformats.org/presentationml/2006/main">
   <p:cSld>
     <p:spTree>
@@ -755,7 +865,7 @@
           <a:p>
             <a:fld id="{458A7E8C-898C-4771-A96C-641A15F9FBDA}" type="slidenum">
               <a:rPr lang="de-DE" smtClean="0"/>
-              <a:t>7</a:t>
+              <a:t>9</a:t>
             </a:fld>
             <a:endParaRPr lang="de-DE"/>
           </a:p>
@@ -774,7 +884,7 @@
 </p:notes>
 </file>
 
-<file path=ppt/notesSlides/notesSlide4.xml><?xml version="1.0" encoding="utf-8"?>
+<file path=ppt/notesSlides/notesSlide5.xml><?xml version="1.0" encoding="utf-8"?>
 <p:notes xmlns:a="http://schemas.openxmlformats.org/drawingml/2006/main" xmlns:r="http://schemas.openxmlformats.org/officeDocument/2006/relationships" xmlns:p="http://schemas.openxmlformats.org/presentationml/2006/main">
   <p:cSld>
     <p:spTree>
@@ -863,7 +973,7 @@
           <a:p>
             <a:fld id="{458A7E8C-898C-4771-A96C-641A15F9FBDA}" type="slidenum">
               <a:rPr lang="de-DE" smtClean="0"/>
-              <a:t>8</a:t>
+              <a:t>10</a:t>
             </a:fld>
             <a:endParaRPr lang="de-DE"/>
           </a:p>
@@ -882,7 +992,7 @@
 </p:notes>
 </file>
 
-<file path=ppt/notesSlides/notesSlide5.xml><?xml version="1.0" encoding="utf-8"?>
+<file path=ppt/notesSlides/notesSlide6.xml><?xml version="1.0" encoding="utf-8"?>
 <p:notes xmlns:a="http://schemas.openxmlformats.org/drawingml/2006/main" xmlns:r="http://schemas.openxmlformats.org/officeDocument/2006/relationships" xmlns:p="http://schemas.openxmlformats.org/presentationml/2006/main">
   <p:cSld>
     <p:spTree>
@@ -971,7 +1081,7 @@
           <a:p>
             <a:fld id="{458A7E8C-898C-4771-A96C-641A15F9FBDA}" type="slidenum">
               <a:rPr lang="de-DE" smtClean="0"/>
-              <a:t>9</a:t>
+              <a:t>11</a:t>
             </a:fld>
             <a:endParaRPr lang="de-DE"/>
           </a:p>
@@ -990,7 +1100,7 @@
 </p:notes>
 </file>
 
-<file path=ppt/notesSlides/notesSlide6.xml><?xml version="1.0" encoding="utf-8"?>
+<file path=ppt/notesSlides/notesSlide7.xml><?xml version="1.0" encoding="utf-8"?>
 <p:notes xmlns:a="http://schemas.openxmlformats.org/drawingml/2006/main" xmlns:r="http://schemas.openxmlformats.org/officeDocument/2006/relationships" xmlns:p="http://schemas.openxmlformats.org/presentationml/2006/main">
   <p:cSld>
     <p:spTree>
@@ -1058,7 +1168,7 @@
           <a:p>
             <a:fld id="{458A7E8C-898C-4771-A96C-641A15F9FBDA}" type="slidenum">
               <a:rPr lang="de-DE" smtClean="0"/>
-              <a:t>10</a:t>
+              <a:t>12</a:t>
             </a:fld>
             <a:endParaRPr lang="de-DE"/>
           </a:p>
@@ -1077,7 +1187,7 @@
 </p:notes>
 </file>
 
-<file path=ppt/notesSlides/notesSlide7.xml><?xml version="1.0" encoding="utf-8"?>
+<file path=ppt/notesSlides/notesSlide8.xml><?xml version="1.0" encoding="utf-8"?>
 <p:notes xmlns:a="http://schemas.openxmlformats.org/drawingml/2006/main" xmlns:r="http://schemas.openxmlformats.org/officeDocument/2006/relationships" xmlns:p="http://schemas.openxmlformats.org/presentationml/2006/main">
   <p:cSld>
     <p:spTree>
@@ -1166,7 +1276,7 @@
           <a:p>
             <a:fld id="{458A7E8C-898C-4771-A96C-641A15F9FBDA}" type="slidenum">
               <a:rPr lang="de-DE" smtClean="0"/>
-              <a:t>11</a:t>
+              <a:t>13</a:t>
             </a:fld>
             <a:endParaRPr lang="de-DE"/>
           </a:p>
@@ -1332,7 +1442,7 @@
           <a:p>
             <a:fld id="{D06DCE7A-60A7-44D3-B5E1-F449311BF86B}" type="datetimeFigureOut">
               <a:rPr lang="de-DE" smtClean="0"/>
-              <a:t>23.09.2025</a:t>
+              <a:t>30.09.2025</a:t>
             </a:fld>
             <a:endParaRPr lang="de-DE"/>
           </a:p>
@@ -1530,7 +1640,7 @@
           <a:p>
             <a:fld id="{D06DCE7A-60A7-44D3-B5E1-F449311BF86B}" type="datetimeFigureOut">
               <a:rPr lang="de-DE" smtClean="0"/>
-              <a:t>23.09.2025</a:t>
+              <a:t>30.09.2025</a:t>
             </a:fld>
             <a:endParaRPr lang="de-DE"/>
           </a:p>
@@ -1738,7 +1848,7 @@
           <a:p>
             <a:fld id="{D06DCE7A-60A7-44D3-B5E1-F449311BF86B}" type="datetimeFigureOut">
               <a:rPr lang="de-DE" smtClean="0"/>
-              <a:t>23.09.2025</a:t>
+              <a:t>30.09.2025</a:t>
             </a:fld>
             <a:endParaRPr lang="de-DE"/>
           </a:p>
@@ -1936,7 +2046,7 @@
           <a:p>
             <a:fld id="{D06DCE7A-60A7-44D3-B5E1-F449311BF86B}" type="datetimeFigureOut">
               <a:rPr lang="de-DE" smtClean="0"/>
-              <a:t>23.09.2025</a:t>
+              <a:t>30.09.2025</a:t>
             </a:fld>
             <a:endParaRPr lang="de-DE"/>
           </a:p>
@@ -2211,7 +2321,7 @@
           <a:p>
             <a:fld id="{D06DCE7A-60A7-44D3-B5E1-F449311BF86B}" type="datetimeFigureOut">
               <a:rPr lang="de-DE" smtClean="0"/>
-              <a:t>23.09.2025</a:t>
+              <a:t>30.09.2025</a:t>
             </a:fld>
             <a:endParaRPr lang="de-DE"/>
           </a:p>
@@ -2476,7 +2586,7 @@
           <a:p>
             <a:fld id="{D06DCE7A-60A7-44D3-B5E1-F449311BF86B}" type="datetimeFigureOut">
               <a:rPr lang="de-DE" smtClean="0"/>
-              <a:t>23.09.2025</a:t>
+              <a:t>30.09.2025</a:t>
             </a:fld>
             <a:endParaRPr lang="de-DE"/>
           </a:p>
@@ -2888,7 +2998,7 @@
           <a:p>
             <a:fld id="{D06DCE7A-60A7-44D3-B5E1-F449311BF86B}" type="datetimeFigureOut">
               <a:rPr lang="de-DE" smtClean="0"/>
-              <a:t>23.09.2025</a:t>
+              <a:t>30.09.2025</a:t>
             </a:fld>
             <a:endParaRPr lang="de-DE"/>
           </a:p>
@@ -3029,7 +3139,7 @@
           <a:p>
             <a:fld id="{D06DCE7A-60A7-44D3-B5E1-F449311BF86B}" type="datetimeFigureOut">
               <a:rPr lang="de-DE" smtClean="0"/>
-              <a:t>23.09.2025</a:t>
+              <a:t>30.09.2025</a:t>
             </a:fld>
             <a:endParaRPr lang="de-DE"/>
           </a:p>
@@ -3142,7 +3252,7 @@
           <a:p>
             <a:fld id="{D06DCE7A-60A7-44D3-B5E1-F449311BF86B}" type="datetimeFigureOut">
               <a:rPr lang="de-DE" smtClean="0"/>
-              <a:t>23.09.2025</a:t>
+              <a:t>30.09.2025</a:t>
             </a:fld>
             <a:endParaRPr lang="de-DE"/>
           </a:p>
@@ -3453,7 +3563,7 @@
           <a:p>
             <a:fld id="{D06DCE7A-60A7-44D3-B5E1-F449311BF86B}" type="datetimeFigureOut">
               <a:rPr lang="de-DE" smtClean="0"/>
-              <a:t>23.09.2025</a:t>
+              <a:t>30.09.2025</a:t>
             </a:fld>
             <a:endParaRPr lang="de-DE"/>
           </a:p>
@@ -3741,7 +3851,7 @@
           <a:p>
             <a:fld id="{D06DCE7A-60A7-44D3-B5E1-F449311BF86B}" type="datetimeFigureOut">
               <a:rPr lang="de-DE" smtClean="0"/>
-              <a:t>23.09.2025</a:t>
+              <a:t>30.09.2025</a:t>
             </a:fld>
             <a:endParaRPr lang="de-DE"/>
           </a:p>
@@ -3982,7 +4092,7 @@
           <a:p>
             <a:fld id="{D06DCE7A-60A7-44D3-B5E1-F449311BF86B}" type="datetimeFigureOut">
               <a:rPr lang="de-DE" smtClean="0"/>
-              <a:t>23.09.2025</a:t>
+              <a:t>30.09.2025</a:t>
             </a:fld>
             <a:endParaRPr lang="de-DE"/>
           </a:p>
@@ -5033,6 +5143,730 @@
   <p:cSld>
     <p:spTree>
       <p:nvGrpSpPr>
+        <p:cNvPr id="1" name="">
+          <a:extLst>
+            <a:ext uri="{FF2B5EF4-FFF2-40B4-BE49-F238E27FC236}">
+              <a16:creationId xmlns:a16="http://schemas.microsoft.com/office/drawing/2014/main" id="{DB32A4A0-D9FA-510C-1BFA-A16405EFBBAF}"/>
+            </a:ext>
+          </a:extLst>
+        </p:cNvPr>
+        <p:cNvGrpSpPr/>
+        <p:nvPr/>
+      </p:nvGrpSpPr>
+      <p:grpSpPr>
+        <a:xfrm>
+          <a:off x="0" y="0"/>
+          <a:ext cx="0" cy="0"/>
+          <a:chOff x="0" y="0"/>
+          <a:chExt cx="0" cy="0"/>
+        </a:xfrm>
+      </p:grpSpPr>
+      <p:sp>
+        <p:nvSpPr>
+          <p:cNvPr id="2" name="Titel 1">
+            <a:extLst>
+              <a:ext uri="{FF2B5EF4-FFF2-40B4-BE49-F238E27FC236}">
+                <a16:creationId xmlns:a16="http://schemas.microsoft.com/office/drawing/2014/main" id="{0A6435A3-0ECE-4757-1AD2-596A36112E94}"/>
+              </a:ext>
+            </a:extLst>
+          </p:cNvPr>
+          <p:cNvSpPr>
+            <a:spLocks noGrp="1"/>
+          </p:cNvSpPr>
+          <p:nvPr>
+            <p:ph type="title"/>
+          </p:nvPr>
+        </p:nvSpPr>
+        <p:spPr/>
+        <p:txBody>
+          <a:bodyPr/>
+          <a:lstStyle/>
+          <a:p>
+            <a:r>
+              <a:rPr lang="de-DE" sz="4000" b="1"/>
+              <a:t>Screenshots</a:t>
+            </a:r>
+          </a:p>
+        </p:txBody>
+      </p:sp>
+      <p:sp>
+        <p:nvSpPr>
+          <p:cNvPr id="20" name="Textfeld 19">
+            <a:extLst>
+              <a:ext uri="{FF2B5EF4-FFF2-40B4-BE49-F238E27FC236}">
+                <a16:creationId xmlns:a16="http://schemas.microsoft.com/office/drawing/2014/main" id="{4D550499-D077-87A5-10B6-8C0E1549194A}"/>
+              </a:ext>
+            </a:extLst>
+          </p:cNvPr>
+          <p:cNvSpPr txBox="1"/>
+          <p:nvPr/>
+        </p:nvSpPr>
+        <p:spPr>
+          <a:xfrm>
+            <a:off x="871443" y="1352461"/>
+            <a:ext cx="1320874" cy="400110"/>
+          </a:xfrm>
+          <a:prstGeom prst="rect">
+            <a:avLst/>
+          </a:prstGeom>
+          <a:noFill/>
+        </p:spPr>
+        <p:txBody>
+          <a:bodyPr wrap="none" rtlCol="0">
+            <a:spAutoFit/>
+          </a:bodyPr>
+          <a:lstStyle/>
+          <a:p>
+            <a:r>
+              <a:rPr lang="de-DE" sz="2000"/>
+              <a:t>IDS Match</a:t>
+            </a:r>
+          </a:p>
+        </p:txBody>
+      </p:sp>
+      <p:sp>
+        <p:nvSpPr>
+          <p:cNvPr id="3" name="Textfeld 2">
+            <a:extLst>
+              <a:ext uri="{FF2B5EF4-FFF2-40B4-BE49-F238E27FC236}">
+                <a16:creationId xmlns:a16="http://schemas.microsoft.com/office/drawing/2014/main" id="{8A3ABBCE-CCBF-9DFE-D8EE-7165494B0112}"/>
+              </a:ext>
+            </a:extLst>
+          </p:cNvPr>
+          <p:cNvSpPr txBox="1"/>
+          <p:nvPr/>
+        </p:nvSpPr>
+        <p:spPr>
+          <a:xfrm>
+            <a:off x="3390868" y="6492875"/>
+            <a:ext cx="5410264" cy="338554"/>
+          </a:xfrm>
+          <a:prstGeom prst="rect">
+            <a:avLst/>
+          </a:prstGeom>
+          <a:noFill/>
+        </p:spPr>
+        <p:txBody>
+          <a:bodyPr wrap="none" rtlCol="0">
+            <a:spAutoFit/>
+          </a:bodyPr>
+          <a:lstStyle/>
+          <a:p>
+            <a:r>
+              <a:rPr lang="de-DE" sz="1600"/>
+              <a:t>Team Bonsai – Hackathon zum BIM-Portal des Bundes 2025</a:t>
+            </a:r>
+          </a:p>
+        </p:txBody>
+      </p:sp>
+      <p:grpSp>
+        <p:nvGrpSpPr>
+          <p:cNvPr id="6" name="Gruppieren 5">
+            <a:extLst>
+              <a:ext uri="{FF2B5EF4-FFF2-40B4-BE49-F238E27FC236}">
+                <a16:creationId xmlns:a16="http://schemas.microsoft.com/office/drawing/2014/main" id="{F4C3C30E-665A-F113-8AEA-4DF6FF4E6CE3}"/>
+              </a:ext>
+            </a:extLst>
+          </p:cNvPr>
+          <p:cNvGrpSpPr/>
+          <p:nvPr/>
+        </p:nvGrpSpPr>
+        <p:grpSpPr>
+          <a:xfrm>
+            <a:off x="962145" y="-460092"/>
+            <a:ext cx="10923922" cy="6891278"/>
+            <a:chOff x="962145" y="-460092"/>
+            <a:chExt cx="10923922" cy="6891278"/>
+          </a:xfrm>
+        </p:grpSpPr>
+        <p:pic>
+          <p:nvPicPr>
+            <p:cNvPr id="2050" name="Picture 2">
+              <a:extLst>
+                <a:ext uri="{FF2B5EF4-FFF2-40B4-BE49-F238E27FC236}">
+                  <a16:creationId xmlns:a16="http://schemas.microsoft.com/office/drawing/2014/main" id="{A6E2180C-7D43-D8E5-0B3D-E43AF38D8FCC}"/>
+                </a:ext>
+              </a:extLst>
+            </p:cNvPr>
+            <p:cNvPicPr>
+              <a:picLocks noChangeAspect="1" noChangeArrowheads="1"/>
+            </p:cNvPicPr>
+            <p:nvPr/>
+          </p:nvPicPr>
+          <p:blipFill>
+            <a:blip r:embed="rId3">
+              <a:extLst>
+                <a:ext uri="{28A0092B-C50C-407E-A947-70E740481C1C}">
+                  <a14:useLocalDpi xmlns:a14="http://schemas.microsoft.com/office/drawing/2010/main" val="0"/>
+                </a:ext>
+              </a:extLst>
+            </a:blip>
+            <a:srcRect/>
+            <a:stretch>
+              <a:fillRect/>
+            </a:stretch>
+          </p:blipFill>
+          <p:spPr bwMode="auto">
+            <a:xfrm>
+              <a:off x="4438743" y="1752571"/>
+              <a:ext cx="3587638" cy="4678615"/>
+            </a:xfrm>
+            <a:prstGeom prst="rect">
+              <a:avLst/>
+            </a:prstGeom>
+            <a:noFill/>
+            <a:extLst>
+              <a:ext uri="{909E8E84-426E-40DD-AFC4-6F175D3DCCD1}">
+                <a14:hiddenFill xmlns:a14="http://schemas.microsoft.com/office/drawing/2010/main">
+                  <a:solidFill>
+                    <a:srgbClr val="FFFFFF"/>
+                  </a:solidFill>
+                </a14:hiddenFill>
+              </a:ext>
+            </a:extLst>
+          </p:spPr>
+        </p:pic>
+        <p:pic>
+          <p:nvPicPr>
+            <p:cNvPr id="3074" name="Picture 2">
+              <a:extLst>
+                <a:ext uri="{FF2B5EF4-FFF2-40B4-BE49-F238E27FC236}">
+                  <a16:creationId xmlns:a16="http://schemas.microsoft.com/office/drawing/2014/main" id="{A688A624-7E8A-FFD7-D517-62D99AD05D57}"/>
+                </a:ext>
+              </a:extLst>
+            </p:cNvPr>
+            <p:cNvPicPr>
+              <a:picLocks noChangeAspect="1" noChangeArrowheads="1"/>
+            </p:cNvPicPr>
+            <p:nvPr/>
+          </p:nvPicPr>
+          <p:blipFill rotWithShape="1">
+            <a:blip r:embed="rId4">
+              <a:extLst>
+                <a:ext uri="{28A0092B-C50C-407E-A947-70E740481C1C}">
+                  <a14:useLocalDpi xmlns:a14="http://schemas.microsoft.com/office/drawing/2010/main" val="0"/>
+                </a:ext>
+              </a:extLst>
+            </a:blip>
+            <a:srcRect t="-27782" b="27782"/>
+            <a:stretch>
+              <a:fillRect/>
+            </a:stretch>
+          </p:blipFill>
+          <p:spPr bwMode="auto">
+            <a:xfrm>
+              <a:off x="8224086" y="-460092"/>
+              <a:ext cx="3661981" cy="6891278"/>
+            </a:xfrm>
+            <a:prstGeom prst="rect">
+              <a:avLst/>
+            </a:prstGeom>
+            <a:noFill/>
+            <a:extLst>
+              <a:ext uri="{909E8E84-426E-40DD-AFC4-6F175D3DCCD1}">
+                <a14:hiddenFill xmlns:a14="http://schemas.microsoft.com/office/drawing/2010/main">
+                  <a:solidFill>
+                    <a:srgbClr val="FFFFFF"/>
+                  </a:solidFill>
+                </a14:hiddenFill>
+              </a:ext>
+            </a:extLst>
+          </p:spPr>
+        </p:pic>
+        <p:pic>
+          <p:nvPicPr>
+            <p:cNvPr id="3076" name="Picture 4">
+              <a:extLst>
+                <a:ext uri="{FF2B5EF4-FFF2-40B4-BE49-F238E27FC236}">
+                  <a16:creationId xmlns:a16="http://schemas.microsoft.com/office/drawing/2014/main" id="{82F92113-2B95-1542-AAD6-2EA45E482785}"/>
+                </a:ext>
+              </a:extLst>
+            </p:cNvPr>
+            <p:cNvPicPr>
+              <a:picLocks noChangeAspect="1" noChangeArrowheads="1"/>
+            </p:cNvPicPr>
+            <p:nvPr/>
+          </p:nvPicPr>
+          <p:blipFill>
+            <a:blip r:embed="rId5">
+              <a:extLst>
+                <a:ext uri="{28A0092B-C50C-407E-A947-70E740481C1C}">
+                  <a14:useLocalDpi xmlns:a14="http://schemas.microsoft.com/office/drawing/2010/main" val="0"/>
+                </a:ext>
+              </a:extLst>
+            </a:blip>
+            <a:srcRect/>
+            <a:stretch>
+              <a:fillRect/>
+            </a:stretch>
+          </p:blipFill>
+          <p:spPr bwMode="auto">
+            <a:xfrm>
+              <a:off x="962145" y="1814260"/>
+              <a:ext cx="3276600" cy="2038350"/>
+            </a:xfrm>
+            <a:prstGeom prst="rect">
+              <a:avLst/>
+            </a:prstGeom>
+            <a:noFill/>
+            <a:extLst>
+              <a:ext uri="{909E8E84-426E-40DD-AFC4-6F175D3DCCD1}">
+                <a14:hiddenFill xmlns:a14="http://schemas.microsoft.com/office/drawing/2010/main">
+                  <a:solidFill>
+                    <a:srgbClr val="FFFFFF"/>
+                  </a:solidFill>
+                </a14:hiddenFill>
+              </a:ext>
+            </a:extLst>
+          </p:spPr>
+        </p:pic>
+      </p:grpSp>
+    </p:spTree>
+    <p:extLst>
+      <p:ext uri="{BB962C8B-B14F-4D97-AF65-F5344CB8AC3E}">
+        <p14:creationId xmlns:p14="http://schemas.microsoft.com/office/powerpoint/2010/main" val="1706552454"/>
+      </p:ext>
+    </p:extLst>
+  </p:cSld>
+  <p:clrMapOvr>
+    <a:masterClrMapping/>
+  </p:clrMapOvr>
+  <p:timing>
+    <p:tnLst>
+      <p:par>
+        <p:cTn id="1" dur="indefinite" restart="never" nodeType="tmRoot">
+          <p:childTnLst>
+            <p:seq concurrent="1" nextAc="seek">
+              <p:cTn id="2" dur="indefinite" nodeType="mainSeq">
+                <p:childTnLst>
+                  <p:par>
+                    <p:cTn id="3" fill="hold">
+                      <p:stCondLst>
+                        <p:cond delay="indefinite"/>
+                        <p:cond evt="onBegin" delay="0">
+                          <p:tn val="2"/>
+                        </p:cond>
+                      </p:stCondLst>
+                      <p:childTnLst>
+                        <p:par>
+                          <p:cTn id="4" fill="hold">
+                            <p:stCondLst>
+                              <p:cond delay="0"/>
+                            </p:stCondLst>
+                            <p:childTnLst>
+                              <p:par>
+                                <p:cTn id="5" presetID="22" presetClass="entr" presetSubtype="8" fill="hold" nodeType="withEffect">
+                                  <p:stCondLst>
+                                    <p:cond delay="0"/>
+                                  </p:stCondLst>
+                                  <p:childTnLst>
+                                    <p:set>
+                                      <p:cBhvr>
+                                        <p:cTn id="6" dur="1" fill="hold">
+                                          <p:stCondLst>
+                                            <p:cond delay="0"/>
+                                          </p:stCondLst>
+                                        </p:cTn>
+                                        <p:tgtEl>
+                                          <p:spTgt spid="6"/>
+                                        </p:tgtEl>
+                                        <p:attrNameLst>
+                                          <p:attrName>style.visibility</p:attrName>
+                                        </p:attrNameLst>
+                                      </p:cBhvr>
+                                      <p:to>
+                                        <p:strVal val="visible"/>
+                                      </p:to>
+                                    </p:set>
+                                    <p:animEffect transition="in" filter="wipe(left)">
+                                      <p:cBhvr>
+                                        <p:cTn id="7" dur="500"/>
+                                        <p:tgtEl>
+                                          <p:spTgt spid="6"/>
+                                        </p:tgtEl>
+                                      </p:cBhvr>
+                                    </p:animEffect>
+                                  </p:childTnLst>
+                                </p:cTn>
+                              </p:par>
+                            </p:childTnLst>
+                          </p:cTn>
+                        </p:par>
+                      </p:childTnLst>
+                    </p:cTn>
+                  </p:par>
+                </p:childTnLst>
+              </p:cTn>
+              <p:prevCondLst>
+                <p:cond evt="onPrev" delay="0">
+                  <p:tgtEl>
+                    <p:sldTgt/>
+                  </p:tgtEl>
+                </p:cond>
+              </p:prevCondLst>
+              <p:nextCondLst>
+                <p:cond evt="onNext" delay="0">
+                  <p:tgtEl>
+                    <p:sldTgt/>
+                  </p:tgtEl>
+                </p:cond>
+              </p:nextCondLst>
+            </p:seq>
+          </p:childTnLst>
+        </p:cTn>
+      </p:par>
+    </p:tnLst>
+  </p:timing>
+</p:sld>
+</file>
+
+<file path=ppt/slides/slide11.xml><?xml version="1.0" encoding="utf-8"?>
+<p:sld xmlns:a="http://schemas.openxmlformats.org/drawingml/2006/main" xmlns:r="http://schemas.openxmlformats.org/officeDocument/2006/relationships" xmlns:p="http://schemas.openxmlformats.org/presentationml/2006/main">
+  <p:cSld>
+    <p:spTree>
+      <p:nvGrpSpPr>
+        <p:cNvPr id="1" name="">
+          <a:extLst>
+            <a:ext uri="{FF2B5EF4-FFF2-40B4-BE49-F238E27FC236}">
+              <a16:creationId xmlns:a16="http://schemas.microsoft.com/office/drawing/2014/main" id="{0011C7C3-90FB-77EE-254C-E021AE7053F1}"/>
+            </a:ext>
+          </a:extLst>
+        </p:cNvPr>
+        <p:cNvGrpSpPr/>
+        <p:nvPr/>
+      </p:nvGrpSpPr>
+      <p:grpSpPr>
+        <a:xfrm>
+          <a:off x="0" y="0"/>
+          <a:ext cx="0" cy="0"/>
+          <a:chOff x="0" y="0"/>
+          <a:chExt cx="0" cy="0"/>
+        </a:xfrm>
+      </p:grpSpPr>
+      <p:sp>
+        <p:nvSpPr>
+          <p:cNvPr id="2" name="Titel 1">
+            <a:extLst>
+              <a:ext uri="{FF2B5EF4-FFF2-40B4-BE49-F238E27FC236}">
+                <a16:creationId xmlns:a16="http://schemas.microsoft.com/office/drawing/2014/main" id="{FE89AE42-D216-F624-4C71-6BC7FA20C5C1}"/>
+              </a:ext>
+            </a:extLst>
+          </p:cNvPr>
+          <p:cNvSpPr>
+            <a:spLocks noGrp="1"/>
+          </p:cNvSpPr>
+          <p:nvPr>
+            <p:ph type="title"/>
+          </p:nvPr>
+        </p:nvSpPr>
+        <p:spPr/>
+        <p:txBody>
+          <a:bodyPr/>
+          <a:lstStyle/>
+          <a:p>
+            <a:r>
+              <a:rPr lang="de-DE" sz="4000" b="1"/>
+              <a:t>Screenshots</a:t>
+            </a:r>
+          </a:p>
+        </p:txBody>
+      </p:sp>
+      <p:sp>
+        <p:nvSpPr>
+          <p:cNvPr id="20" name="Textfeld 19">
+            <a:extLst>
+              <a:ext uri="{FF2B5EF4-FFF2-40B4-BE49-F238E27FC236}">
+                <a16:creationId xmlns:a16="http://schemas.microsoft.com/office/drawing/2014/main" id="{360C7006-2BB7-A333-D9B5-0A23C9BDF70C}"/>
+              </a:ext>
+            </a:extLst>
+          </p:cNvPr>
+          <p:cNvSpPr txBox="1"/>
+          <p:nvPr/>
+        </p:nvSpPr>
+        <p:spPr>
+          <a:xfrm>
+            <a:off x="871443" y="1352461"/>
+            <a:ext cx="1246816" cy="400110"/>
+          </a:xfrm>
+          <a:prstGeom prst="rect">
+            <a:avLst/>
+          </a:prstGeom>
+          <a:noFill/>
+        </p:spPr>
+        <p:txBody>
+          <a:bodyPr wrap="none" rtlCol="0">
+            <a:spAutoFit/>
+          </a:bodyPr>
+          <a:lstStyle/>
+          <a:p>
+            <a:r>
+              <a:rPr lang="de-DE" sz="2000"/>
+              <a:t>IFC Patch</a:t>
+            </a:r>
+          </a:p>
+        </p:txBody>
+      </p:sp>
+      <p:sp>
+        <p:nvSpPr>
+          <p:cNvPr id="3" name="Textfeld 2">
+            <a:extLst>
+              <a:ext uri="{FF2B5EF4-FFF2-40B4-BE49-F238E27FC236}">
+                <a16:creationId xmlns:a16="http://schemas.microsoft.com/office/drawing/2014/main" id="{C03CA85B-6880-2710-C8B3-74044B04B01D}"/>
+              </a:ext>
+            </a:extLst>
+          </p:cNvPr>
+          <p:cNvSpPr txBox="1"/>
+          <p:nvPr/>
+        </p:nvSpPr>
+        <p:spPr>
+          <a:xfrm>
+            <a:off x="3390868" y="6492875"/>
+            <a:ext cx="5410264" cy="338554"/>
+          </a:xfrm>
+          <a:prstGeom prst="rect">
+            <a:avLst/>
+          </a:prstGeom>
+          <a:noFill/>
+        </p:spPr>
+        <p:txBody>
+          <a:bodyPr wrap="none" rtlCol="0">
+            <a:spAutoFit/>
+          </a:bodyPr>
+          <a:lstStyle/>
+          <a:p>
+            <a:r>
+              <a:rPr lang="de-DE" sz="1600"/>
+              <a:t>Team Bonsai – Hackathon zum BIM-Portal des Bundes 2025</a:t>
+            </a:r>
+          </a:p>
+        </p:txBody>
+      </p:sp>
+      <p:grpSp>
+        <p:nvGrpSpPr>
+          <p:cNvPr id="8" name="Gruppieren 7">
+            <a:extLst>
+              <a:ext uri="{FF2B5EF4-FFF2-40B4-BE49-F238E27FC236}">
+                <a16:creationId xmlns:a16="http://schemas.microsoft.com/office/drawing/2014/main" id="{5CF5C93A-42DE-A5A9-1742-1E0FFEC46A6B}"/>
+              </a:ext>
+            </a:extLst>
+          </p:cNvPr>
+          <p:cNvGrpSpPr/>
+          <p:nvPr/>
+        </p:nvGrpSpPr>
+        <p:grpSpPr>
+          <a:xfrm>
+            <a:off x="838200" y="1801898"/>
+            <a:ext cx="10935618" cy="4353972"/>
+            <a:chOff x="838200" y="1801898"/>
+            <a:chExt cx="10935618" cy="4353972"/>
+          </a:xfrm>
+        </p:grpSpPr>
+        <p:pic>
+          <p:nvPicPr>
+            <p:cNvPr id="5" name="Grafik 4">
+              <a:extLst>
+                <a:ext uri="{FF2B5EF4-FFF2-40B4-BE49-F238E27FC236}">
+                  <a16:creationId xmlns:a16="http://schemas.microsoft.com/office/drawing/2014/main" id="{F20ED7DE-D112-6F00-BBC7-6BCB425CC143}"/>
+                </a:ext>
+              </a:extLst>
+            </p:cNvPr>
+            <p:cNvPicPr>
+              <a:picLocks noChangeAspect="1"/>
+            </p:cNvPicPr>
+            <p:nvPr/>
+          </p:nvPicPr>
+          <p:blipFill>
+            <a:blip r:embed="rId3"/>
+            <a:stretch>
+              <a:fillRect/>
+            </a:stretch>
+          </p:blipFill>
+          <p:spPr>
+            <a:xfrm>
+              <a:off x="939591" y="1801898"/>
+              <a:ext cx="4211143" cy="1949107"/>
+            </a:xfrm>
+            <a:prstGeom prst="rect">
+              <a:avLst/>
+            </a:prstGeom>
+          </p:spPr>
+        </p:pic>
+        <p:sp>
+          <p:nvSpPr>
+            <p:cNvPr id="4" name="Textfeld 3">
+              <a:extLst>
+                <a:ext uri="{FF2B5EF4-FFF2-40B4-BE49-F238E27FC236}">
+                  <a16:creationId xmlns:a16="http://schemas.microsoft.com/office/drawing/2014/main" id="{EBD140CE-5C86-108E-6140-3F10CE3777F1}"/>
+                </a:ext>
+              </a:extLst>
+            </p:cNvPr>
+            <p:cNvSpPr txBox="1"/>
+            <p:nvPr/>
+          </p:nvSpPr>
+          <p:spPr>
+            <a:xfrm>
+              <a:off x="838200" y="3800332"/>
+              <a:ext cx="3658502" cy="307777"/>
+            </a:xfrm>
+            <a:prstGeom prst="rect">
+              <a:avLst/>
+            </a:prstGeom>
+            <a:noFill/>
+          </p:spPr>
+          <p:txBody>
+            <a:bodyPr wrap="none" rtlCol="0">
+              <a:spAutoFit/>
+            </a:bodyPr>
+            <a:lstStyle/>
+            <a:p>
+              <a:r>
+                <a:rPr lang="de-DE" sz="1400"/>
+                <a:t>IDS Patch File erstellt durch Match-Extension</a:t>
+              </a:r>
+            </a:p>
+          </p:txBody>
+        </p:sp>
+        <p:pic>
+          <p:nvPicPr>
+            <p:cNvPr id="7" name="Grafik 6">
+              <a:extLst>
+                <a:ext uri="{FF2B5EF4-FFF2-40B4-BE49-F238E27FC236}">
+                  <a16:creationId xmlns:a16="http://schemas.microsoft.com/office/drawing/2014/main" id="{63A28071-D7E8-3333-371A-742758B42D21}"/>
+                </a:ext>
+              </a:extLst>
+            </p:cNvPr>
+            <p:cNvPicPr>
+              <a:picLocks noChangeAspect="1"/>
+            </p:cNvPicPr>
+            <p:nvPr/>
+          </p:nvPicPr>
+          <p:blipFill>
+            <a:blip r:embed="rId4">
+              <a:extLst>
+                <a:ext uri="{28A0092B-C50C-407E-A947-70E740481C1C}">
+                  <a14:useLocalDpi xmlns:a14="http://schemas.microsoft.com/office/drawing/2010/main" val="0"/>
+                </a:ext>
+              </a:extLst>
+            </a:blip>
+            <a:stretch>
+              <a:fillRect/>
+            </a:stretch>
+          </p:blipFill>
+          <p:spPr>
+            <a:xfrm>
+              <a:off x="871443" y="4293607"/>
+              <a:ext cx="10902375" cy="1862263"/>
+            </a:xfrm>
+            <a:prstGeom prst="rect">
+              <a:avLst/>
+            </a:prstGeom>
+          </p:spPr>
+        </p:pic>
+      </p:grpSp>
+    </p:spTree>
+    <p:extLst>
+      <p:ext uri="{BB962C8B-B14F-4D97-AF65-F5344CB8AC3E}">
+        <p14:creationId xmlns:p14="http://schemas.microsoft.com/office/powerpoint/2010/main" val="3019654523"/>
+      </p:ext>
+    </p:extLst>
+  </p:cSld>
+  <p:clrMapOvr>
+    <a:masterClrMapping/>
+  </p:clrMapOvr>
+  <p:timing>
+    <p:tnLst>
+      <p:par>
+        <p:cTn id="1" dur="indefinite" restart="never" nodeType="tmRoot">
+          <p:childTnLst>
+            <p:seq concurrent="1" nextAc="seek">
+              <p:cTn id="2" dur="indefinite" nodeType="mainSeq">
+                <p:childTnLst>
+                  <p:par>
+                    <p:cTn id="3" fill="hold">
+                      <p:stCondLst>
+                        <p:cond delay="indefinite"/>
+                        <p:cond evt="onBegin" delay="0">
+                          <p:tn val="2"/>
+                        </p:cond>
+                      </p:stCondLst>
+                      <p:childTnLst>
+                        <p:par>
+                          <p:cTn id="4" fill="hold">
+                            <p:stCondLst>
+                              <p:cond delay="0"/>
+                            </p:stCondLst>
+                            <p:childTnLst>
+                              <p:par>
+                                <p:cTn id="5" presetID="22" presetClass="entr" presetSubtype="1" fill="hold" nodeType="withEffect">
+                                  <p:stCondLst>
+                                    <p:cond delay="0"/>
+                                  </p:stCondLst>
+                                  <p:childTnLst>
+                                    <p:set>
+                                      <p:cBhvr>
+                                        <p:cTn id="6" dur="1" fill="hold">
+                                          <p:stCondLst>
+                                            <p:cond delay="0"/>
+                                          </p:stCondLst>
+                                        </p:cTn>
+                                        <p:tgtEl>
+                                          <p:spTgt spid="8"/>
+                                        </p:tgtEl>
+                                        <p:attrNameLst>
+                                          <p:attrName>style.visibility</p:attrName>
+                                        </p:attrNameLst>
+                                      </p:cBhvr>
+                                      <p:to>
+                                        <p:strVal val="visible"/>
+                                      </p:to>
+                                    </p:set>
+                                    <p:animEffect transition="in" filter="wipe(up)">
+                                      <p:cBhvr>
+                                        <p:cTn id="7" dur="500"/>
+                                        <p:tgtEl>
+                                          <p:spTgt spid="8"/>
+                                        </p:tgtEl>
+                                      </p:cBhvr>
+                                    </p:animEffect>
+                                  </p:childTnLst>
+                                </p:cTn>
+                              </p:par>
+                            </p:childTnLst>
+                          </p:cTn>
+                        </p:par>
+                      </p:childTnLst>
+                    </p:cTn>
+                  </p:par>
+                </p:childTnLst>
+              </p:cTn>
+              <p:prevCondLst>
+                <p:cond evt="onPrev" delay="0">
+                  <p:tgtEl>
+                    <p:sldTgt/>
+                  </p:tgtEl>
+                </p:cond>
+              </p:prevCondLst>
+              <p:nextCondLst>
+                <p:cond evt="onNext" delay="0">
+                  <p:tgtEl>
+                    <p:sldTgt/>
+                  </p:tgtEl>
+                </p:cond>
+              </p:nextCondLst>
+            </p:seq>
+          </p:childTnLst>
+        </p:cTn>
+      </p:par>
+    </p:tnLst>
+  </p:timing>
+</p:sld>
+</file>
+
+<file path=ppt/slides/slide12.xml><?xml version="1.0" encoding="utf-8"?>
+<p:sld xmlns:a="http://schemas.openxmlformats.org/drawingml/2006/main" xmlns:r="http://schemas.openxmlformats.org/officeDocument/2006/relationships" xmlns:p="http://schemas.openxmlformats.org/presentationml/2006/main">
+  <p:cSld>
+    <p:spTree>
+      <p:nvGrpSpPr>
         <p:cNvPr id="1" name=""/>
         <p:cNvGrpSpPr/>
         <p:nvPr/>
@@ -5402,7 +6236,7 @@
 </p:sld>
 </file>
 
-<file path=ppt/slides/slide11.xml><?xml version="1.0" encoding="utf-8"?>
+<file path=ppt/slides/slide13.xml><?xml version="1.0" encoding="utf-8"?>
 <p:sld xmlns:a="http://schemas.openxmlformats.org/drawingml/2006/main" xmlns:r="http://schemas.openxmlformats.org/officeDocument/2006/relationships" xmlns:p="http://schemas.openxmlformats.org/presentationml/2006/main">
   <p:cSld>
     <p:spTree>
@@ -6564,6 +7398,907 @@
 </file>
 
 <file path=ppt/slides/slide5.xml><?xml version="1.0" encoding="utf-8"?>
+<p:sld xmlns:a="http://schemas.openxmlformats.org/drawingml/2006/main" xmlns:r="http://schemas.openxmlformats.org/officeDocument/2006/relationships" xmlns:p="http://schemas.openxmlformats.org/presentationml/2006/main" show="0">
+  <p:cSld>
+    <p:spTree>
+      <p:nvGrpSpPr>
+        <p:cNvPr id="1" name="">
+          <a:extLst>
+            <a:ext uri="{FF2B5EF4-FFF2-40B4-BE49-F238E27FC236}">
+              <a16:creationId xmlns:a16="http://schemas.microsoft.com/office/drawing/2014/main" id="{A3E13C1B-F5E5-D8D2-B853-3F24526DD81F}"/>
+            </a:ext>
+          </a:extLst>
+        </p:cNvPr>
+        <p:cNvGrpSpPr/>
+        <p:nvPr/>
+      </p:nvGrpSpPr>
+      <p:grpSpPr>
+        <a:xfrm>
+          <a:off x="0" y="0"/>
+          <a:ext cx="0" cy="0"/>
+          <a:chOff x="0" y="0"/>
+          <a:chExt cx="0" cy="0"/>
+        </a:xfrm>
+      </p:grpSpPr>
+      <p:sp>
+        <p:nvSpPr>
+          <p:cNvPr id="2" name="Titel 1">
+            <a:extLst>
+              <a:ext uri="{FF2B5EF4-FFF2-40B4-BE49-F238E27FC236}">
+                <a16:creationId xmlns:a16="http://schemas.microsoft.com/office/drawing/2014/main" id="{B11BB6A5-FDD0-1D68-994A-5CBFB1E6060B}"/>
+              </a:ext>
+            </a:extLst>
+          </p:cNvPr>
+          <p:cNvSpPr>
+            <a:spLocks noGrp="1"/>
+          </p:cNvSpPr>
+          <p:nvPr>
+            <p:ph type="title"/>
+          </p:nvPr>
+        </p:nvSpPr>
+        <p:spPr/>
+        <p:txBody>
+          <a:bodyPr/>
+          <a:lstStyle/>
+          <a:p>
+            <a:r>
+              <a:rPr lang="de-DE" sz="4000" b="1"/>
+              <a:t>Challenge for BIM authoring</a:t>
+            </a:r>
+          </a:p>
+        </p:txBody>
+      </p:sp>
+      <p:pic>
+        <p:nvPicPr>
+          <p:cNvPr id="7" name="Grafik 6">
+            <a:extLst>
+              <a:ext uri="{FF2B5EF4-FFF2-40B4-BE49-F238E27FC236}">
+                <a16:creationId xmlns:a16="http://schemas.microsoft.com/office/drawing/2014/main" id="{C1CE7C36-135D-32A1-2FC6-7FA327082B7E}"/>
+              </a:ext>
+            </a:extLst>
+          </p:cNvPr>
+          <p:cNvPicPr>
+            <a:picLocks noChangeAspect="1"/>
+          </p:cNvPicPr>
+          <p:nvPr/>
+        </p:nvPicPr>
+        <p:blipFill>
+          <a:blip r:embed="rId2"/>
+          <a:stretch>
+            <a:fillRect/>
+          </a:stretch>
+        </p:blipFill>
+        <p:spPr>
+          <a:xfrm>
+            <a:off x="685800" y="2209702"/>
+            <a:ext cx="2568163" cy="2270957"/>
+          </a:xfrm>
+          <a:prstGeom prst="rect">
+            <a:avLst/>
+          </a:prstGeom>
+        </p:spPr>
+      </p:pic>
+      <p:pic>
+        <p:nvPicPr>
+          <p:cNvPr id="9" name="Grafik 8">
+            <a:extLst>
+              <a:ext uri="{FF2B5EF4-FFF2-40B4-BE49-F238E27FC236}">
+                <a16:creationId xmlns:a16="http://schemas.microsoft.com/office/drawing/2014/main" id="{BE920728-54BE-5F8B-0C73-2F342F06BB33}"/>
+              </a:ext>
+            </a:extLst>
+          </p:cNvPr>
+          <p:cNvPicPr>
+            <a:picLocks noChangeAspect="1"/>
+          </p:cNvPicPr>
+          <p:nvPr/>
+        </p:nvPicPr>
+        <p:blipFill>
+          <a:blip r:embed="rId3"/>
+          <a:stretch>
+            <a:fillRect/>
+          </a:stretch>
+        </p:blipFill>
+        <p:spPr>
+          <a:xfrm>
+            <a:off x="9540083" y="2402742"/>
+            <a:ext cx="1813717" cy="2255715"/>
+          </a:xfrm>
+          <a:prstGeom prst="rect">
+            <a:avLst/>
+          </a:prstGeom>
+        </p:spPr>
+      </p:pic>
+      <p:pic>
+        <p:nvPicPr>
+          <p:cNvPr id="10" name="Grafik 9">
+            <a:extLst>
+              <a:ext uri="{FF2B5EF4-FFF2-40B4-BE49-F238E27FC236}">
+                <a16:creationId xmlns:a16="http://schemas.microsoft.com/office/drawing/2014/main" id="{9FFB0F49-8EF6-9BA7-D709-50FA19473E11}"/>
+              </a:ext>
+            </a:extLst>
+          </p:cNvPr>
+          <p:cNvPicPr>
+            <a:picLocks noChangeAspect="1"/>
+          </p:cNvPicPr>
+          <p:nvPr/>
+        </p:nvPicPr>
+        <p:blipFill>
+          <a:blip r:embed="rId4"/>
+          <a:stretch>
+            <a:fillRect/>
+          </a:stretch>
+        </p:blipFill>
+        <p:spPr>
+          <a:xfrm>
+            <a:off x="4334470" y="3185123"/>
+            <a:ext cx="922100" cy="853514"/>
+          </a:xfrm>
+          <a:prstGeom prst="rect">
+            <a:avLst/>
+          </a:prstGeom>
+        </p:spPr>
+      </p:pic>
+      <p:pic>
+        <p:nvPicPr>
+          <p:cNvPr id="11" name="Grafik 10">
+            <a:extLst>
+              <a:ext uri="{FF2B5EF4-FFF2-40B4-BE49-F238E27FC236}">
+                <a16:creationId xmlns:a16="http://schemas.microsoft.com/office/drawing/2014/main" id="{7BD1D166-A989-01EE-DA89-8C171C272661}"/>
+              </a:ext>
+            </a:extLst>
+          </p:cNvPr>
+          <p:cNvPicPr>
+            <a:picLocks noChangeAspect="1"/>
+          </p:cNvPicPr>
+          <p:nvPr/>
+        </p:nvPicPr>
+        <p:blipFill>
+          <a:blip r:embed="rId4"/>
+          <a:stretch>
+            <a:fillRect/>
+          </a:stretch>
+        </p:blipFill>
+        <p:spPr>
+          <a:xfrm>
+            <a:off x="7240230" y="3185123"/>
+            <a:ext cx="922100" cy="853514"/>
+          </a:xfrm>
+          <a:prstGeom prst="rect">
+            <a:avLst/>
+          </a:prstGeom>
+        </p:spPr>
+      </p:pic>
+      <p:pic>
+        <p:nvPicPr>
+          <p:cNvPr id="13" name="Grafik 12">
+            <a:extLst>
+              <a:ext uri="{FF2B5EF4-FFF2-40B4-BE49-F238E27FC236}">
+                <a16:creationId xmlns:a16="http://schemas.microsoft.com/office/drawing/2014/main" id="{991BFB54-4240-6834-B959-9729C8FE01DB}"/>
+              </a:ext>
+            </a:extLst>
+          </p:cNvPr>
+          <p:cNvPicPr>
+            <a:picLocks noChangeAspect="1"/>
+          </p:cNvPicPr>
+          <p:nvPr/>
+        </p:nvPicPr>
+        <p:blipFill>
+          <a:blip r:embed="rId5"/>
+          <a:stretch>
+            <a:fillRect/>
+          </a:stretch>
+        </p:blipFill>
+        <p:spPr>
+          <a:xfrm>
+            <a:off x="3468485" y="3606800"/>
+            <a:ext cx="777307" cy="175275"/>
+          </a:xfrm>
+          <a:prstGeom prst="rect">
+            <a:avLst/>
+          </a:prstGeom>
+        </p:spPr>
+      </p:pic>
+      <p:pic>
+        <p:nvPicPr>
+          <p:cNvPr id="14" name="Grafik 13">
+            <a:extLst>
+              <a:ext uri="{FF2B5EF4-FFF2-40B4-BE49-F238E27FC236}">
+                <a16:creationId xmlns:a16="http://schemas.microsoft.com/office/drawing/2014/main" id="{A94F117F-F23C-2496-CE62-78B2F0DC9701}"/>
+              </a:ext>
+            </a:extLst>
+          </p:cNvPr>
+          <p:cNvPicPr>
+            <a:picLocks noChangeAspect="1"/>
+          </p:cNvPicPr>
+          <p:nvPr/>
+        </p:nvPicPr>
+        <p:blipFill>
+          <a:blip r:embed="rId5"/>
+          <a:stretch>
+            <a:fillRect/>
+          </a:stretch>
+        </p:blipFill>
+        <p:spPr>
+          <a:xfrm rot="10800000">
+            <a:off x="8340633" y="3606799"/>
+            <a:ext cx="777307" cy="175275"/>
+          </a:xfrm>
+          <a:prstGeom prst="rect">
+            <a:avLst/>
+          </a:prstGeom>
+        </p:spPr>
+      </p:pic>
+      <p:pic>
+        <p:nvPicPr>
+          <p:cNvPr id="16" name="Grafik 15">
+            <a:extLst>
+              <a:ext uri="{FF2B5EF4-FFF2-40B4-BE49-F238E27FC236}">
+                <a16:creationId xmlns:a16="http://schemas.microsoft.com/office/drawing/2014/main" id="{BF469EA4-C9C0-D040-38BA-39C734C15011}"/>
+              </a:ext>
+            </a:extLst>
+          </p:cNvPr>
+          <p:cNvPicPr>
+            <a:picLocks noChangeAspect="1"/>
+          </p:cNvPicPr>
+          <p:nvPr/>
+        </p:nvPicPr>
+        <p:blipFill>
+          <a:blip r:embed="rId6"/>
+          <a:stretch>
+            <a:fillRect/>
+          </a:stretch>
+        </p:blipFill>
+        <p:spPr>
+          <a:xfrm>
+            <a:off x="4028715" y="4136379"/>
+            <a:ext cx="1533610" cy="344280"/>
+          </a:xfrm>
+          <a:prstGeom prst="rect">
+            <a:avLst/>
+          </a:prstGeom>
+        </p:spPr>
+      </p:pic>
+      <p:pic>
+        <p:nvPicPr>
+          <p:cNvPr id="17" name="Grafik 16">
+            <a:extLst>
+              <a:ext uri="{FF2B5EF4-FFF2-40B4-BE49-F238E27FC236}">
+                <a16:creationId xmlns:a16="http://schemas.microsoft.com/office/drawing/2014/main" id="{CB641E73-ACF9-E859-E1E7-7172119D3564}"/>
+              </a:ext>
+            </a:extLst>
+          </p:cNvPr>
+          <p:cNvPicPr>
+            <a:picLocks noChangeAspect="1"/>
+          </p:cNvPicPr>
+          <p:nvPr/>
+        </p:nvPicPr>
+        <p:blipFill>
+          <a:blip r:embed="rId6"/>
+          <a:stretch>
+            <a:fillRect/>
+          </a:stretch>
+        </p:blipFill>
+        <p:spPr>
+          <a:xfrm>
+            <a:off x="7028597" y="4136379"/>
+            <a:ext cx="1533610" cy="344280"/>
+          </a:xfrm>
+          <a:prstGeom prst="rect">
+            <a:avLst/>
+          </a:prstGeom>
+        </p:spPr>
+      </p:pic>
+      <p:grpSp>
+        <p:nvGrpSpPr>
+          <p:cNvPr id="4" name="Gruppieren 3">
+            <a:extLst>
+              <a:ext uri="{FF2B5EF4-FFF2-40B4-BE49-F238E27FC236}">
+                <a16:creationId xmlns:a16="http://schemas.microsoft.com/office/drawing/2014/main" id="{AD4A563E-0070-AEB5-EFE6-D4FC70A80D61}"/>
+              </a:ext>
+            </a:extLst>
+          </p:cNvPr>
+          <p:cNvGrpSpPr/>
+          <p:nvPr/>
+        </p:nvGrpSpPr>
+        <p:grpSpPr>
+          <a:xfrm>
+            <a:off x="3468485" y="2428718"/>
+            <a:ext cx="5673980" cy="1971838"/>
+            <a:chOff x="3468485" y="2428718"/>
+            <a:chExt cx="5673980" cy="1971838"/>
+          </a:xfrm>
+        </p:grpSpPr>
+        <p:pic>
+          <p:nvPicPr>
+            <p:cNvPr id="1026" name="Picture 2" descr="Ungleich Zeichen | Tastenkombination Mac Tastatur">
+              <a:extLst>
+                <a:ext uri="{FF2B5EF4-FFF2-40B4-BE49-F238E27FC236}">
+                  <a16:creationId xmlns:a16="http://schemas.microsoft.com/office/drawing/2014/main" id="{2FD1C37B-87C3-D854-FC0D-52A2792C4674}"/>
+                </a:ext>
+              </a:extLst>
+            </p:cNvPr>
+            <p:cNvPicPr>
+              <a:picLocks noChangeAspect="1" noChangeArrowheads="1"/>
+            </p:cNvPicPr>
+            <p:nvPr/>
+          </p:nvPicPr>
+          <p:blipFill>
+            <a:blip r:embed="rId7">
+              <a:extLst>
+                <a:ext uri="{28A0092B-C50C-407E-A947-70E740481C1C}">
+                  <a14:useLocalDpi xmlns:a14="http://schemas.microsoft.com/office/drawing/2010/main" val="0"/>
+                </a:ext>
+              </a:extLst>
+            </a:blip>
+            <a:srcRect/>
+            <a:stretch>
+              <a:fillRect/>
+            </a:stretch>
+          </p:blipFill>
+          <p:spPr bwMode="auto">
+            <a:xfrm>
+              <a:off x="5523192" y="2988316"/>
+              <a:ext cx="1412240" cy="1412240"/>
+            </a:xfrm>
+            <a:prstGeom prst="rect">
+              <a:avLst/>
+            </a:prstGeom>
+            <a:noFill/>
+            <a:extLst>
+              <a:ext uri="{909E8E84-426E-40DD-AFC4-6F175D3DCCD1}">
+                <a14:hiddenFill xmlns:a14="http://schemas.microsoft.com/office/drawing/2010/main">
+                  <a:solidFill>
+                    <a:srgbClr val="FFFFFF"/>
+                  </a:solidFill>
+                </a14:hiddenFill>
+              </a:ext>
+            </a:extLst>
+          </p:spPr>
+        </p:pic>
+        <p:sp>
+          <p:nvSpPr>
+            <p:cNvPr id="18" name="Textfeld 17">
+              <a:extLst>
+                <a:ext uri="{FF2B5EF4-FFF2-40B4-BE49-F238E27FC236}">
+                  <a16:creationId xmlns:a16="http://schemas.microsoft.com/office/drawing/2014/main" id="{060AA31E-32C0-6701-418C-DCF1DDA4B62D}"/>
+                </a:ext>
+              </a:extLst>
+            </p:cNvPr>
+            <p:cNvSpPr txBox="1"/>
+            <p:nvPr/>
+          </p:nvSpPr>
+          <p:spPr>
+            <a:xfrm>
+              <a:off x="3468485" y="2428718"/>
+              <a:ext cx="2694127" cy="923330"/>
+            </a:xfrm>
+            <a:prstGeom prst="rect">
+              <a:avLst/>
+            </a:prstGeom>
+            <a:noFill/>
+          </p:spPr>
+          <p:txBody>
+            <a:bodyPr wrap="square" rtlCol="0">
+              <a:spAutoFit/>
+            </a:bodyPr>
+            <a:lstStyle/>
+            <a:p>
+              <a:pPr algn="ctr"/>
+              <a:r>
+                <a:rPr lang="de-DE"/>
+                <a:t>„Schrippe“ </a:t>
+              </a:r>
+              <a:br>
+                <a:rPr lang="de-DE"/>
+              </a:br>
+              <a:r>
+                <a:rPr lang="de-DE"/>
+                <a:t>„Roundabout“</a:t>
+              </a:r>
+              <a:br>
+                <a:rPr lang="de-DE"/>
+              </a:br>
+              <a:endParaRPr lang="de-DE"/>
+            </a:p>
+          </p:txBody>
+        </p:sp>
+        <p:sp>
+          <p:nvSpPr>
+            <p:cNvPr id="19" name="Textfeld 18">
+              <a:extLst>
+                <a:ext uri="{FF2B5EF4-FFF2-40B4-BE49-F238E27FC236}">
+                  <a16:creationId xmlns:a16="http://schemas.microsoft.com/office/drawing/2014/main" id="{C76B1B2F-794B-7787-3065-DD5F9328B67B}"/>
+                </a:ext>
+              </a:extLst>
+            </p:cNvPr>
+            <p:cNvSpPr txBox="1"/>
+            <p:nvPr/>
+          </p:nvSpPr>
+          <p:spPr>
+            <a:xfrm>
+              <a:off x="6448338" y="2428718"/>
+              <a:ext cx="2694127" cy="646331"/>
+            </a:xfrm>
+            <a:prstGeom prst="rect">
+              <a:avLst/>
+            </a:prstGeom>
+            <a:noFill/>
+          </p:spPr>
+          <p:txBody>
+            <a:bodyPr wrap="square" rtlCol="0">
+              <a:spAutoFit/>
+            </a:bodyPr>
+            <a:lstStyle/>
+            <a:p>
+              <a:pPr algn="ctr"/>
+              <a:r>
+                <a:rPr lang="de-DE"/>
+                <a:t>„Brötchen“</a:t>
+              </a:r>
+              <a:br>
+                <a:rPr lang="de-DE"/>
+              </a:br>
+              <a:r>
+                <a:rPr lang="de-DE"/>
+                <a:t>„Traffic circle“</a:t>
+              </a:r>
+            </a:p>
+          </p:txBody>
+        </p:sp>
+      </p:grpSp>
+      <p:sp>
+        <p:nvSpPr>
+          <p:cNvPr id="20" name="Textfeld 19">
+            <a:extLst>
+              <a:ext uri="{FF2B5EF4-FFF2-40B4-BE49-F238E27FC236}">
+                <a16:creationId xmlns:a16="http://schemas.microsoft.com/office/drawing/2014/main" id="{7958B201-F38F-8C8E-4865-5CB9B5C9A9E9}"/>
+              </a:ext>
+            </a:extLst>
+          </p:cNvPr>
+          <p:cNvSpPr txBox="1"/>
+          <p:nvPr/>
+        </p:nvSpPr>
+        <p:spPr>
+          <a:xfrm>
+            <a:off x="871443" y="1352461"/>
+            <a:ext cx="7918258" cy="400110"/>
+          </a:xfrm>
+          <a:prstGeom prst="rect">
+            <a:avLst/>
+          </a:prstGeom>
+          <a:noFill/>
+        </p:spPr>
+        <p:txBody>
+          <a:bodyPr wrap="none" rtlCol="0">
+            <a:spAutoFit/>
+          </a:bodyPr>
+          <a:lstStyle/>
+          <a:p>
+            <a:r>
+              <a:rPr lang="en-US" sz="2000"/>
+              <a:t>The customer's requirements meet the engineers' optimised workflow</a:t>
+            </a:r>
+            <a:endParaRPr lang="de-DE" sz="2000"/>
+          </a:p>
+        </p:txBody>
+      </p:sp>
+      <p:sp>
+        <p:nvSpPr>
+          <p:cNvPr id="3" name="Textfeld 2">
+            <a:extLst>
+              <a:ext uri="{FF2B5EF4-FFF2-40B4-BE49-F238E27FC236}">
+                <a16:creationId xmlns:a16="http://schemas.microsoft.com/office/drawing/2014/main" id="{CDD7BAF2-CA21-FD08-AEE7-E9459ECA352B}"/>
+              </a:ext>
+            </a:extLst>
+          </p:cNvPr>
+          <p:cNvSpPr txBox="1"/>
+          <p:nvPr/>
+        </p:nvSpPr>
+        <p:spPr>
+          <a:xfrm>
+            <a:off x="2906697" y="5214718"/>
+            <a:ext cx="6378605" cy="1077218"/>
+          </a:xfrm>
+          <a:prstGeom prst="rect">
+            <a:avLst/>
+          </a:prstGeom>
+          <a:noFill/>
+        </p:spPr>
+        <p:txBody>
+          <a:bodyPr wrap="none" rtlCol="0">
+            <a:spAutoFit/>
+          </a:bodyPr>
+          <a:lstStyle/>
+          <a:p>
+            <a:pPr algn="ctr"/>
+            <a:r>
+              <a:rPr lang="en-US" sz="3200" b="1">
+                <a:solidFill>
+                  <a:srgbClr val="C00000"/>
+                </a:solidFill>
+              </a:rPr>
+              <a:t>Task: Tool support for conversion </a:t>
+            </a:r>
+            <a:br>
+              <a:rPr lang="en-US" sz="3200" b="1">
+                <a:solidFill>
+                  <a:srgbClr val="C00000"/>
+                </a:solidFill>
+              </a:rPr>
+            </a:br>
+            <a:r>
+              <a:rPr lang="en-US" sz="3200" b="1">
+                <a:solidFill>
+                  <a:srgbClr val="C00000"/>
+                </a:solidFill>
+              </a:rPr>
+              <a:t>from Engineer BIM to AIA BIM</a:t>
+            </a:r>
+            <a:r>
+              <a:rPr lang="de-DE" sz="3200" b="1">
+                <a:solidFill>
+                  <a:srgbClr val="C00000"/>
+                </a:solidFill>
+              </a:rPr>
+              <a:t> </a:t>
+            </a:r>
+          </a:p>
+        </p:txBody>
+      </p:sp>
+      <p:sp>
+        <p:nvSpPr>
+          <p:cNvPr id="5" name="Textfeld 4">
+            <a:extLst>
+              <a:ext uri="{FF2B5EF4-FFF2-40B4-BE49-F238E27FC236}">
+                <a16:creationId xmlns:a16="http://schemas.microsoft.com/office/drawing/2014/main" id="{75E5ED35-5D38-5D78-FB62-7A2B2EFF5F53}"/>
+              </a:ext>
+            </a:extLst>
+          </p:cNvPr>
+          <p:cNvSpPr txBox="1"/>
+          <p:nvPr/>
+        </p:nvSpPr>
+        <p:spPr>
+          <a:xfrm>
+            <a:off x="3390868" y="6492875"/>
+            <a:ext cx="5823004" cy="276999"/>
+          </a:xfrm>
+          <a:prstGeom prst="rect">
+            <a:avLst/>
+          </a:prstGeom>
+          <a:noFill/>
+        </p:spPr>
+        <p:txBody>
+          <a:bodyPr wrap="none" rtlCol="0">
+            <a:spAutoFit/>
+          </a:bodyPr>
+          <a:lstStyle/>
+          <a:p>
+            <a:r>
+              <a:rPr lang="de-DE" sz="1200"/>
+              <a:t>Team Bonsai (Krieger, Weise, Gmeiner) – Hackathon zum BIM-Portal des Bundes 2025</a:t>
+            </a:r>
+          </a:p>
+        </p:txBody>
+      </p:sp>
+      <p:sp>
+        <p:nvSpPr>
+          <p:cNvPr id="6" name="Textfeld 5">
+            <a:extLst>
+              <a:ext uri="{FF2B5EF4-FFF2-40B4-BE49-F238E27FC236}">
+                <a16:creationId xmlns:a16="http://schemas.microsoft.com/office/drawing/2014/main" id="{CC88A3D2-75EB-0901-683D-B1255567CDD1}"/>
+              </a:ext>
+            </a:extLst>
+          </p:cNvPr>
+          <p:cNvSpPr txBox="1"/>
+          <p:nvPr/>
+        </p:nvSpPr>
+        <p:spPr>
+          <a:xfrm>
+            <a:off x="1091822" y="2315370"/>
+            <a:ext cx="1712794" cy="369332"/>
+          </a:xfrm>
+          <a:prstGeom prst="rect">
+            <a:avLst/>
+          </a:prstGeom>
+          <a:solidFill>
+            <a:schemeClr val="bg1"/>
+          </a:solidFill>
+        </p:spPr>
+        <p:txBody>
+          <a:bodyPr wrap="square" rtlCol="0">
+            <a:spAutoFit/>
+          </a:bodyPr>
+          <a:lstStyle/>
+          <a:p>
+            <a:pPr algn="ctr"/>
+            <a:r>
+              <a:rPr lang="de-DE" b="1"/>
+              <a:t>Owner</a:t>
+            </a:r>
+          </a:p>
+        </p:txBody>
+      </p:sp>
+      <p:sp>
+        <p:nvSpPr>
+          <p:cNvPr id="8" name="Textfeld 7">
+            <a:extLst>
+              <a:ext uri="{FF2B5EF4-FFF2-40B4-BE49-F238E27FC236}">
+                <a16:creationId xmlns:a16="http://schemas.microsoft.com/office/drawing/2014/main" id="{3FDB81A8-C921-A682-9F74-90DB4C4203A7}"/>
+              </a:ext>
+            </a:extLst>
+          </p:cNvPr>
+          <p:cNvSpPr txBox="1"/>
+          <p:nvPr/>
+        </p:nvSpPr>
+        <p:spPr>
+          <a:xfrm>
+            <a:off x="9540082" y="2315370"/>
+            <a:ext cx="1862621" cy="369332"/>
+          </a:xfrm>
+          <a:prstGeom prst="rect">
+            <a:avLst/>
+          </a:prstGeom>
+          <a:solidFill>
+            <a:schemeClr val="bg1"/>
+          </a:solidFill>
+        </p:spPr>
+        <p:txBody>
+          <a:bodyPr wrap="square" rtlCol="0">
+            <a:spAutoFit/>
+          </a:bodyPr>
+          <a:lstStyle/>
+          <a:p>
+            <a:pPr algn="ctr"/>
+            <a:r>
+              <a:rPr lang="de-DE" b="1"/>
+              <a:t>Engineer</a:t>
+            </a:r>
+          </a:p>
+        </p:txBody>
+      </p:sp>
+      <p:sp>
+        <p:nvSpPr>
+          <p:cNvPr id="12" name="Textfeld 11">
+            <a:extLst>
+              <a:ext uri="{FF2B5EF4-FFF2-40B4-BE49-F238E27FC236}">
+                <a16:creationId xmlns:a16="http://schemas.microsoft.com/office/drawing/2014/main" id="{05F60FC7-B423-07F6-7F5F-6093B7CA72B8}"/>
+              </a:ext>
+            </a:extLst>
+          </p:cNvPr>
+          <p:cNvSpPr txBox="1"/>
+          <p:nvPr/>
+        </p:nvSpPr>
+        <p:spPr>
+          <a:xfrm>
+            <a:off x="3995075" y="4092160"/>
+            <a:ext cx="1712794" cy="646331"/>
+          </a:xfrm>
+          <a:prstGeom prst="rect">
+            <a:avLst/>
+          </a:prstGeom>
+          <a:solidFill>
+            <a:schemeClr val="bg1"/>
+          </a:solidFill>
+        </p:spPr>
+        <p:txBody>
+          <a:bodyPr wrap="square" rtlCol="0">
+            <a:spAutoFit/>
+          </a:bodyPr>
+          <a:lstStyle/>
+          <a:p>
+            <a:pPr algn="ctr"/>
+            <a:r>
+              <a:rPr lang="de-DE" b="1"/>
+              <a:t>BIM Templates</a:t>
+            </a:r>
+            <a:br>
+              <a:rPr lang="de-DE" b="1"/>
+            </a:br>
+            <a:r>
+              <a:rPr lang="de-DE" b="1"/>
+              <a:t>for Owner EIR</a:t>
+            </a:r>
+          </a:p>
+        </p:txBody>
+      </p:sp>
+      <p:sp>
+        <p:nvSpPr>
+          <p:cNvPr id="15" name="Textfeld 14">
+            <a:extLst>
+              <a:ext uri="{FF2B5EF4-FFF2-40B4-BE49-F238E27FC236}">
+                <a16:creationId xmlns:a16="http://schemas.microsoft.com/office/drawing/2014/main" id="{D4085FC4-201A-BDBF-6A94-29947EE5B7C2}"/>
+              </a:ext>
+            </a:extLst>
+          </p:cNvPr>
+          <p:cNvSpPr txBox="1"/>
+          <p:nvPr/>
+        </p:nvSpPr>
+        <p:spPr>
+          <a:xfrm>
+            <a:off x="6573548" y="4092160"/>
+            <a:ext cx="2516011" cy="646331"/>
+          </a:xfrm>
+          <a:prstGeom prst="rect">
+            <a:avLst/>
+          </a:prstGeom>
+          <a:solidFill>
+            <a:schemeClr val="bg1"/>
+          </a:solidFill>
+        </p:spPr>
+        <p:txBody>
+          <a:bodyPr wrap="square" rtlCol="0">
+            <a:spAutoFit/>
+          </a:bodyPr>
+          <a:lstStyle/>
+          <a:p>
+            <a:pPr algn="ctr"/>
+            <a:r>
+              <a:rPr lang="de-DE" b="1"/>
+              <a:t>BIM Templates</a:t>
+            </a:r>
+            <a:br>
+              <a:rPr lang="de-DE" b="1"/>
+            </a:br>
+            <a:r>
+              <a:rPr lang="de-DE" b="1"/>
+              <a:t>used by the Engineer</a:t>
+            </a:r>
+          </a:p>
+        </p:txBody>
+      </p:sp>
+    </p:spTree>
+    <p:extLst>
+      <p:ext uri="{BB962C8B-B14F-4D97-AF65-F5344CB8AC3E}">
+        <p14:creationId xmlns:p14="http://schemas.microsoft.com/office/powerpoint/2010/main" val="3249686555"/>
+      </p:ext>
+    </p:extLst>
+  </p:cSld>
+  <p:clrMapOvr>
+    <a:masterClrMapping/>
+  </p:clrMapOvr>
+  <p:timing>
+    <p:tnLst>
+      <p:par>
+        <p:cTn id="1" dur="indefinite" restart="never" nodeType="tmRoot">
+          <p:childTnLst>
+            <p:seq concurrent="1" nextAc="seek">
+              <p:cTn id="2" dur="indefinite" nodeType="mainSeq">
+                <p:childTnLst>
+                  <p:par>
+                    <p:cTn id="3" fill="hold">
+                      <p:stCondLst>
+                        <p:cond delay="indefinite"/>
+                      </p:stCondLst>
+                      <p:childTnLst>
+                        <p:par>
+                          <p:cTn id="4" fill="hold">
+                            <p:stCondLst>
+                              <p:cond delay="0"/>
+                            </p:stCondLst>
+                            <p:childTnLst>
+                              <p:par>
+                                <p:cTn id="5" presetID="10" presetClass="entr" presetSubtype="0" fill="hold" nodeType="clickEffect">
+                                  <p:stCondLst>
+                                    <p:cond delay="0"/>
+                                  </p:stCondLst>
+                                  <p:childTnLst>
+                                    <p:set>
+                                      <p:cBhvr>
+                                        <p:cTn id="6" dur="1" fill="hold">
+                                          <p:stCondLst>
+                                            <p:cond delay="0"/>
+                                          </p:stCondLst>
+                                        </p:cTn>
+                                        <p:tgtEl>
+                                          <p:spTgt spid="4"/>
+                                        </p:tgtEl>
+                                        <p:attrNameLst>
+                                          <p:attrName>style.visibility</p:attrName>
+                                        </p:attrNameLst>
+                                      </p:cBhvr>
+                                      <p:to>
+                                        <p:strVal val="visible"/>
+                                      </p:to>
+                                    </p:set>
+                                    <p:animEffect transition="in" filter="fade">
+                                      <p:cBhvr>
+                                        <p:cTn id="7" dur="500"/>
+                                        <p:tgtEl>
+                                          <p:spTgt spid="4"/>
+                                        </p:tgtEl>
+                                      </p:cBhvr>
+                                    </p:animEffect>
+                                  </p:childTnLst>
+                                </p:cTn>
+                              </p:par>
+                            </p:childTnLst>
+                          </p:cTn>
+                        </p:par>
+                      </p:childTnLst>
+                    </p:cTn>
+                  </p:par>
+                  <p:par>
+                    <p:cTn id="8" fill="hold">
+                      <p:stCondLst>
+                        <p:cond delay="indefinite"/>
+                      </p:stCondLst>
+                      <p:childTnLst>
+                        <p:par>
+                          <p:cTn id="9" fill="hold">
+                            <p:stCondLst>
+                              <p:cond delay="0"/>
+                            </p:stCondLst>
+                            <p:childTnLst>
+                              <p:par>
+                                <p:cTn id="10" presetID="22" presetClass="entr" presetSubtype="8" fill="hold" grpId="0" nodeType="clickEffect">
+                                  <p:stCondLst>
+                                    <p:cond delay="0"/>
+                                  </p:stCondLst>
+                                  <p:childTnLst>
+                                    <p:set>
+                                      <p:cBhvr>
+                                        <p:cTn id="11" dur="1" fill="hold">
+                                          <p:stCondLst>
+                                            <p:cond delay="0"/>
+                                          </p:stCondLst>
+                                        </p:cTn>
+                                        <p:tgtEl>
+                                          <p:spTgt spid="3"/>
+                                        </p:tgtEl>
+                                        <p:attrNameLst>
+                                          <p:attrName>style.visibility</p:attrName>
+                                        </p:attrNameLst>
+                                      </p:cBhvr>
+                                      <p:to>
+                                        <p:strVal val="visible"/>
+                                      </p:to>
+                                    </p:set>
+                                    <p:animEffect transition="in" filter="wipe(left)">
+                                      <p:cBhvr>
+                                        <p:cTn id="12" dur="500"/>
+                                        <p:tgtEl>
+                                          <p:spTgt spid="3"/>
+                                        </p:tgtEl>
+                                      </p:cBhvr>
+                                    </p:animEffect>
+                                  </p:childTnLst>
+                                </p:cTn>
+                              </p:par>
+                            </p:childTnLst>
+                          </p:cTn>
+                        </p:par>
+                      </p:childTnLst>
+                    </p:cTn>
+                  </p:par>
+                </p:childTnLst>
+              </p:cTn>
+              <p:prevCondLst>
+                <p:cond evt="onPrev" delay="0">
+                  <p:tgtEl>
+                    <p:sldTgt/>
+                  </p:tgtEl>
+                </p:cond>
+              </p:prevCondLst>
+              <p:nextCondLst>
+                <p:cond evt="onNext" delay="0">
+                  <p:tgtEl>
+                    <p:sldTgt/>
+                  </p:tgtEl>
+                </p:cond>
+              </p:nextCondLst>
+            </p:seq>
+          </p:childTnLst>
+        </p:cTn>
+      </p:par>
+    </p:tnLst>
+    <p:bldLst>
+      <p:bldP spid="3" grpId="0"/>
+    </p:bldLst>
+  </p:timing>
+</p:sld>
+</file>
+
+<file path=ppt/slides/slide6.xml><?xml version="1.0" encoding="utf-8"?>
 <p:sld xmlns:a="http://schemas.openxmlformats.org/drawingml/2006/main" xmlns:r="http://schemas.openxmlformats.org/officeDocument/2006/relationships" xmlns:p="http://schemas.openxmlformats.org/presentationml/2006/main">
   <p:cSld>
     <p:spTree>
@@ -7515,7 +9250,960 @@
 </p:sld>
 </file>
 
-<file path=ppt/slides/slide6.xml><?xml version="1.0" encoding="utf-8"?>
+<file path=ppt/slides/slide7.xml><?xml version="1.0" encoding="utf-8"?>
+<p:sld xmlns:a="http://schemas.openxmlformats.org/drawingml/2006/main" xmlns:r="http://schemas.openxmlformats.org/officeDocument/2006/relationships" xmlns:p="http://schemas.openxmlformats.org/presentationml/2006/main" show="0">
+  <p:cSld>
+    <p:spTree>
+      <p:nvGrpSpPr>
+        <p:cNvPr id="1" name="">
+          <a:extLst>
+            <a:ext uri="{FF2B5EF4-FFF2-40B4-BE49-F238E27FC236}">
+              <a16:creationId xmlns:a16="http://schemas.microsoft.com/office/drawing/2014/main" id="{6A26251C-2699-E36E-4241-E2A3497AB618}"/>
+            </a:ext>
+          </a:extLst>
+        </p:cNvPr>
+        <p:cNvGrpSpPr/>
+        <p:nvPr/>
+      </p:nvGrpSpPr>
+      <p:grpSpPr>
+        <a:xfrm>
+          <a:off x="0" y="0"/>
+          <a:ext cx="0" cy="0"/>
+          <a:chOff x="0" y="0"/>
+          <a:chExt cx="0" cy="0"/>
+        </a:xfrm>
+      </p:grpSpPr>
+      <p:sp>
+        <p:nvSpPr>
+          <p:cNvPr id="2" name="Titel 1">
+            <a:extLst>
+              <a:ext uri="{FF2B5EF4-FFF2-40B4-BE49-F238E27FC236}">
+                <a16:creationId xmlns:a16="http://schemas.microsoft.com/office/drawing/2014/main" id="{4975FEEE-E9F1-1CB0-0B89-E9B197858892}"/>
+              </a:ext>
+            </a:extLst>
+          </p:cNvPr>
+          <p:cNvSpPr>
+            <a:spLocks noGrp="1"/>
+          </p:cNvSpPr>
+          <p:nvPr>
+            <p:ph type="title"/>
+          </p:nvPr>
+        </p:nvSpPr>
+        <p:spPr/>
+        <p:txBody>
+          <a:bodyPr>
+            <a:normAutofit/>
+          </a:bodyPr>
+          <a:lstStyle/>
+          <a:p>
+            <a:r>
+              <a:rPr lang="de-DE" sz="4000" b="1"/>
+              <a:t>Idea</a:t>
+            </a:r>
+          </a:p>
+        </p:txBody>
+      </p:sp>
+      <p:sp>
+        <p:nvSpPr>
+          <p:cNvPr id="20" name="Textfeld 19">
+            <a:extLst>
+              <a:ext uri="{FF2B5EF4-FFF2-40B4-BE49-F238E27FC236}">
+                <a16:creationId xmlns:a16="http://schemas.microsoft.com/office/drawing/2014/main" id="{D80D7CF7-4125-7D9E-9493-175C3FA85F14}"/>
+              </a:ext>
+            </a:extLst>
+          </p:cNvPr>
+          <p:cNvSpPr txBox="1"/>
+          <p:nvPr/>
+        </p:nvSpPr>
+        <p:spPr>
+          <a:xfrm>
+            <a:off x="871443" y="1352461"/>
+            <a:ext cx="7908191" cy="400110"/>
+          </a:xfrm>
+          <a:prstGeom prst="rect">
+            <a:avLst/>
+          </a:prstGeom>
+          <a:noFill/>
+        </p:spPr>
+        <p:txBody>
+          <a:bodyPr wrap="none" rtlCol="0">
+            <a:spAutoFit/>
+          </a:bodyPr>
+          <a:lstStyle/>
+          <a:p>
+            <a:r>
+              <a:rPr lang="en-US" sz="2000"/>
+              <a:t>The customer's requirements meet the engineers' optimised workflow</a:t>
+            </a:r>
+            <a:endParaRPr lang="de-DE" sz="2000"/>
+          </a:p>
+        </p:txBody>
+      </p:sp>
+      <p:grpSp>
+        <p:nvGrpSpPr>
+          <p:cNvPr id="3" name="Gruppieren 2">
+            <a:extLst>
+              <a:ext uri="{FF2B5EF4-FFF2-40B4-BE49-F238E27FC236}">
+                <a16:creationId xmlns:a16="http://schemas.microsoft.com/office/drawing/2014/main" id="{4898A4C3-5AA6-C38B-2728-704F93C8E470}"/>
+              </a:ext>
+            </a:extLst>
+          </p:cNvPr>
+          <p:cNvGrpSpPr/>
+          <p:nvPr/>
+        </p:nvGrpSpPr>
+        <p:grpSpPr>
+          <a:xfrm>
+            <a:off x="838200" y="3408212"/>
+            <a:ext cx="9813880" cy="1302654"/>
+            <a:chOff x="838200" y="3523962"/>
+            <a:chExt cx="9813880" cy="1302654"/>
+          </a:xfrm>
+        </p:grpSpPr>
+        <p:sp>
+          <p:nvSpPr>
+            <p:cNvPr id="18" name="Textfeld 17">
+              <a:extLst>
+                <a:ext uri="{FF2B5EF4-FFF2-40B4-BE49-F238E27FC236}">
+                  <a16:creationId xmlns:a16="http://schemas.microsoft.com/office/drawing/2014/main" id="{7DC245CD-B434-0458-F8E6-D477C595CC21}"/>
+                </a:ext>
+              </a:extLst>
+            </p:cNvPr>
+            <p:cNvSpPr txBox="1"/>
+            <p:nvPr/>
+          </p:nvSpPr>
+          <p:spPr>
+            <a:xfrm>
+              <a:off x="3500720" y="4457284"/>
+              <a:ext cx="2694127" cy="369332"/>
+            </a:xfrm>
+            <a:prstGeom prst="rect">
+              <a:avLst/>
+            </a:prstGeom>
+            <a:noFill/>
+          </p:spPr>
+          <p:txBody>
+            <a:bodyPr wrap="square" rtlCol="0">
+              <a:spAutoFit/>
+            </a:bodyPr>
+            <a:lstStyle/>
+            <a:p>
+              <a:pPr algn="ctr"/>
+              <a:r>
+                <a:rPr lang="de-DE"/>
+                <a:t>EIR from Owner</a:t>
+              </a:r>
+            </a:p>
+          </p:txBody>
+        </p:sp>
+        <p:sp>
+          <p:nvSpPr>
+            <p:cNvPr id="19" name="Textfeld 18">
+              <a:extLst>
+                <a:ext uri="{FF2B5EF4-FFF2-40B4-BE49-F238E27FC236}">
+                  <a16:creationId xmlns:a16="http://schemas.microsoft.com/office/drawing/2014/main" id="{154FB6F5-EB65-5E33-6114-6F42F4C7819E}"/>
+                </a:ext>
+              </a:extLst>
+            </p:cNvPr>
+            <p:cNvSpPr txBox="1"/>
+            <p:nvPr/>
+          </p:nvSpPr>
+          <p:spPr>
+            <a:xfrm>
+              <a:off x="7090014" y="4457284"/>
+              <a:ext cx="3562066" cy="369332"/>
+            </a:xfrm>
+            <a:prstGeom prst="rect">
+              <a:avLst/>
+            </a:prstGeom>
+            <a:noFill/>
+          </p:spPr>
+          <p:txBody>
+            <a:bodyPr wrap="square" rtlCol="0">
+              <a:spAutoFit/>
+            </a:bodyPr>
+            <a:lstStyle/>
+            <a:p>
+              <a:pPr algn="ctr"/>
+              <a:r>
+                <a:rPr lang="de-DE"/>
+                <a:t> IFC data exported by the Engineer</a:t>
+              </a:r>
+            </a:p>
+          </p:txBody>
+        </p:sp>
+        <p:pic>
+          <p:nvPicPr>
+            <p:cNvPr id="24" name="Grafik 23">
+              <a:extLst>
+                <a:ext uri="{FF2B5EF4-FFF2-40B4-BE49-F238E27FC236}">
+                  <a16:creationId xmlns:a16="http://schemas.microsoft.com/office/drawing/2014/main" id="{4474A7B2-E071-757A-2BA1-610E31B94F0B}"/>
+                </a:ext>
+              </a:extLst>
+            </p:cNvPr>
+            <p:cNvPicPr>
+              <a:picLocks noChangeAspect="1"/>
+            </p:cNvPicPr>
+            <p:nvPr/>
+          </p:nvPicPr>
+          <p:blipFill>
+            <a:blip r:embed="rId3"/>
+            <a:stretch>
+              <a:fillRect/>
+            </a:stretch>
+          </p:blipFill>
+          <p:spPr>
+            <a:xfrm>
+              <a:off x="4325318" y="3626660"/>
+              <a:ext cx="922100" cy="853514"/>
+            </a:xfrm>
+            <a:prstGeom prst="rect">
+              <a:avLst/>
+            </a:prstGeom>
+          </p:spPr>
+        </p:pic>
+        <p:pic>
+          <p:nvPicPr>
+            <p:cNvPr id="25" name="Grafik 24">
+              <a:extLst>
+                <a:ext uri="{FF2B5EF4-FFF2-40B4-BE49-F238E27FC236}">
+                  <a16:creationId xmlns:a16="http://schemas.microsoft.com/office/drawing/2014/main" id="{5212CD38-5625-044A-F3FD-1DFADAB48CF3}"/>
+                </a:ext>
+              </a:extLst>
+            </p:cNvPr>
+            <p:cNvPicPr>
+              <a:picLocks noChangeAspect="1"/>
+            </p:cNvPicPr>
+            <p:nvPr/>
+          </p:nvPicPr>
+          <p:blipFill>
+            <a:blip r:embed="rId3"/>
+            <a:stretch>
+              <a:fillRect/>
+            </a:stretch>
+          </p:blipFill>
+          <p:spPr>
+            <a:xfrm>
+              <a:off x="8407903" y="3626660"/>
+              <a:ext cx="922100" cy="853514"/>
+            </a:xfrm>
+            <a:prstGeom prst="rect">
+              <a:avLst/>
+            </a:prstGeom>
+          </p:spPr>
+        </p:pic>
+        <p:sp>
+          <p:nvSpPr>
+            <p:cNvPr id="28" name="Textfeld 27">
+              <a:extLst>
+                <a:ext uri="{FF2B5EF4-FFF2-40B4-BE49-F238E27FC236}">
+                  <a16:creationId xmlns:a16="http://schemas.microsoft.com/office/drawing/2014/main" id="{5845D67E-360C-B9D8-14AE-665AB192F56B}"/>
+                </a:ext>
+              </a:extLst>
+            </p:cNvPr>
+            <p:cNvSpPr txBox="1"/>
+            <p:nvPr/>
+          </p:nvSpPr>
+          <p:spPr>
+            <a:xfrm>
+              <a:off x="838200" y="3768996"/>
+              <a:ext cx="2570704" cy="523220"/>
+            </a:xfrm>
+            <a:prstGeom prst="rect">
+              <a:avLst/>
+            </a:prstGeom>
+            <a:noFill/>
+          </p:spPr>
+          <p:txBody>
+            <a:bodyPr wrap="none" rtlCol="0">
+              <a:spAutoFit/>
+            </a:bodyPr>
+            <a:lstStyle/>
+            <a:p>
+              <a:pPr marL="514350" indent="-514350">
+                <a:spcAft>
+                  <a:spcPts val="3600"/>
+                </a:spcAft>
+                <a:buFont typeface="+mj-lt"/>
+                <a:buAutoNum type="arabicParenR" startAt="2"/>
+              </a:pPr>
+              <a:r>
+                <a:rPr lang="de-DE" sz="2800" b="1"/>
+                <a:t>IDS-Match </a:t>
+              </a:r>
+            </a:p>
+          </p:txBody>
+        </p:sp>
+        <p:sp>
+          <p:nvSpPr>
+            <p:cNvPr id="30" name="Textfeld 29">
+              <a:extLst>
+                <a:ext uri="{FF2B5EF4-FFF2-40B4-BE49-F238E27FC236}">
+                  <a16:creationId xmlns:a16="http://schemas.microsoft.com/office/drawing/2014/main" id="{922303E6-1BAB-E667-C8AA-51A4DFE3DCFA}"/>
+                </a:ext>
+              </a:extLst>
+            </p:cNvPr>
+            <p:cNvSpPr txBox="1"/>
+            <p:nvPr/>
+          </p:nvSpPr>
+          <p:spPr>
+            <a:xfrm>
+              <a:off x="6587355" y="3523962"/>
+              <a:ext cx="582211" cy="1015663"/>
+            </a:xfrm>
+            <a:prstGeom prst="rect">
+              <a:avLst/>
+            </a:prstGeom>
+            <a:noFill/>
+          </p:spPr>
+          <p:txBody>
+            <a:bodyPr wrap="none" rtlCol="0">
+              <a:spAutoFit/>
+            </a:bodyPr>
+            <a:lstStyle/>
+            <a:p>
+              <a:pPr>
+                <a:spcAft>
+                  <a:spcPts val="3600"/>
+                </a:spcAft>
+              </a:pPr>
+              <a:r>
+                <a:rPr lang="de-DE" sz="6000" b="1"/>
+                <a:t>?</a:t>
+              </a:r>
+            </a:p>
+          </p:txBody>
+        </p:sp>
+        <p:pic>
+          <p:nvPicPr>
+            <p:cNvPr id="32" name="Grafik 31">
+              <a:extLst>
+                <a:ext uri="{FF2B5EF4-FFF2-40B4-BE49-F238E27FC236}">
+                  <a16:creationId xmlns:a16="http://schemas.microsoft.com/office/drawing/2014/main" id="{7E7E7E63-0073-BF11-629C-8146ACDD325E}"/>
+                </a:ext>
+              </a:extLst>
+            </p:cNvPr>
+            <p:cNvPicPr>
+              <a:picLocks noChangeAspect="1"/>
+            </p:cNvPicPr>
+            <p:nvPr/>
+          </p:nvPicPr>
+          <p:blipFill>
+            <a:blip r:embed="rId4"/>
+            <a:stretch>
+              <a:fillRect/>
+            </a:stretch>
+          </p:blipFill>
+          <p:spPr>
+            <a:xfrm>
+              <a:off x="5416920" y="3799766"/>
+              <a:ext cx="507541" cy="645350"/>
+            </a:xfrm>
+            <a:prstGeom prst="rect">
+              <a:avLst/>
+            </a:prstGeom>
+          </p:spPr>
+        </p:pic>
+        <p:pic>
+          <p:nvPicPr>
+            <p:cNvPr id="33" name="Grafik 32">
+              <a:extLst>
+                <a:ext uri="{FF2B5EF4-FFF2-40B4-BE49-F238E27FC236}">
+                  <a16:creationId xmlns:a16="http://schemas.microsoft.com/office/drawing/2014/main" id="{877CE452-82FC-D68A-B753-DB5CFDAD1FB5}"/>
+                </a:ext>
+              </a:extLst>
+            </p:cNvPr>
+            <p:cNvPicPr>
+              <a:picLocks noChangeAspect="1"/>
+            </p:cNvPicPr>
+            <p:nvPr/>
+          </p:nvPicPr>
+          <p:blipFill>
+            <a:blip r:embed="rId4"/>
+            <a:stretch>
+              <a:fillRect/>
+            </a:stretch>
+          </p:blipFill>
+          <p:spPr>
+            <a:xfrm>
+              <a:off x="7930763" y="3799766"/>
+              <a:ext cx="507541" cy="645350"/>
+            </a:xfrm>
+            <a:prstGeom prst="rect">
+              <a:avLst/>
+            </a:prstGeom>
+          </p:spPr>
+        </p:pic>
+      </p:grpSp>
+      <p:grpSp>
+        <p:nvGrpSpPr>
+          <p:cNvPr id="31" name="Gruppieren 30">
+            <a:extLst>
+              <a:ext uri="{FF2B5EF4-FFF2-40B4-BE49-F238E27FC236}">
+                <a16:creationId xmlns:a16="http://schemas.microsoft.com/office/drawing/2014/main" id="{4B40C548-1FE4-F628-330A-94E503B385A9}"/>
+              </a:ext>
+            </a:extLst>
+          </p:cNvPr>
+          <p:cNvGrpSpPr/>
+          <p:nvPr/>
+        </p:nvGrpSpPr>
+        <p:grpSpPr>
+          <a:xfrm>
+            <a:off x="838200" y="4913030"/>
+            <a:ext cx="9379753" cy="1599186"/>
+            <a:chOff x="838200" y="5005630"/>
+            <a:chExt cx="9379753" cy="1599186"/>
+          </a:xfrm>
+        </p:grpSpPr>
+        <p:sp>
+          <p:nvSpPr>
+            <p:cNvPr id="29" name="Textfeld 28">
+              <a:extLst>
+                <a:ext uri="{FF2B5EF4-FFF2-40B4-BE49-F238E27FC236}">
+                  <a16:creationId xmlns:a16="http://schemas.microsoft.com/office/drawing/2014/main" id="{26424261-3FF3-B43D-F61E-5ED62F358098}"/>
+                </a:ext>
+              </a:extLst>
+            </p:cNvPr>
+            <p:cNvSpPr txBox="1"/>
+            <p:nvPr/>
+          </p:nvSpPr>
+          <p:spPr>
+            <a:xfrm>
+              <a:off x="838200" y="5357405"/>
+              <a:ext cx="2389885" cy="523220"/>
+            </a:xfrm>
+            <a:prstGeom prst="rect">
+              <a:avLst/>
+            </a:prstGeom>
+            <a:noFill/>
+          </p:spPr>
+          <p:txBody>
+            <a:bodyPr wrap="none" rtlCol="0">
+              <a:spAutoFit/>
+            </a:bodyPr>
+            <a:lstStyle/>
+            <a:p>
+              <a:pPr marL="514350" indent="-514350">
+                <a:spcAft>
+                  <a:spcPts val="3600"/>
+                </a:spcAft>
+                <a:buFont typeface="+mj-lt"/>
+                <a:buAutoNum type="arabicParenR" startAt="3"/>
+              </a:pPr>
+              <a:r>
+                <a:rPr lang="de-DE" sz="2800" b="1"/>
+                <a:t>IFC-Patch</a:t>
+              </a:r>
+              <a:endParaRPr lang="de-DE" sz="2000" b="1"/>
+            </a:p>
+          </p:txBody>
+        </p:sp>
+        <p:pic>
+          <p:nvPicPr>
+            <p:cNvPr id="35" name="Grafik 34">
+              <a:extLst>
+                <a:ext uri="{FF2B5EF4-FFF2-40B4-BE49-F238E27FC236}">
+                  <a16:creationId xmlns:a16="http://schemas.microsoft.com/office/drawing/2014/main" id="{6C185D5F-9740-39BE-ED3B-6BCE887868E8}"/>
+                </a:ext>
+              </a:extLst>
+            </p:cNvPr>
+            <p:cNvPicPr>
+              <a:picLocks noChangeAspect="1"/>
+            </p:cNvPicPr>
+            <p:nvPr/>
+          </p:nvPicPr>
+          <p:blipFill>
+            <a:blip r:embed="rId5"/>
+            <a:stretch>
+              <a:fillRect/>
+            </a:stretch>
+          </p:blipFill>
+          <p:spPr>
+            <a:xfrm>
+              <a:off x="3710634" y="5102634"/>
+              <a:ext cx="2467340" cy="1502182"/>
+            </a:xfrm>
+            <a:prstGeom prst="rect">
+              <a:avLst/>
+            </a:prstGeom>
+          </p:spPr>
+        </p:pic>
+        <p:pic>
+          <p:nvPicPr>
+            <p:cNvPr id="36" name="Grafik 35">
+              <a:extLst>
+                <a:ext uri="{FF2B5EF4-FFF2-40B4-BE49-F238E27FC236}">
+                  <a16:creationId xmlns:a16="http://schemas.microsoft.com/office/drawing/2014/main" id="{C104C05B-76D4-E871-7BD6-1D815DA3C1E0}"/>
+                </a:ext>
+              </a:extLst>
+            </p:cNvPr>
+            <p:cNvPicPr>
+              <a:picLocks noChangeAspect="1"/>
+            </p:cNvPicPr>
+            <p:nvPr/>
+          </p:nvPicPr>
+          <p:blipFill>
+            <a:blip r:embed="rId6"/>
+            <a:stretch>
+              <a:fillRect/>
+            </a:stretch>
+          </p:blipFill>
+          <p:spPr>
+            <a:xfrm rot="10800000">
+              <a:off x="6271714" y="5505539"/>
+              <a:ext cx="1123832" cy="253413"/>
+            </a:xfrm>
+            <a:prstGeom prst="rect">
+              <a:avLst/>
+            </a:prstGeom>
+          </p:spPr>
+        </p:pic>
+        <p:pic>
+          <p:nvPicPr>
+            <p:cNvPr id="38" name="Grafik 37">
+              <a:extLst>
+                <a:ext uri="{FF2B5EF4-FFF2-40B4-BE49-F238E27FC236}">
+                  <a16:creationId xmlns:a16="http://schemas.microsoft.com/office/drawing/2014/main" id="{972CD797-5AA1-E28A-6CB3-147304580CD6}"/>
+                </a:ext>
+              </a:extLst>
+            </p:cNvPr>
+            <p:cNvPicPr>
+              <a:picLocks noChangeAspect="1"/>
+            </p:cNvPicPr>
+            <p:nvPr/>
+          </p:nvPicPr>
+          <p:blipFill>
+            <a:blip r:embed="rId7"/>
+            <a:stretch>
+              <a:fillRect/>
+            </a:stretch>
+          </p:blipFill>
+          <p:spPr>
+            <a:xfrm>
+              <a:off x="7711926" y="5005630"/>
+              <a:ext cx="2506027" cy="1506645"/>
+            </a:xfrm>
+            <a:prstGeom prst="rect">
+              <a:avLst/>
+            </a:prstGeom>
+          </p:spPr>
+        </p:pic>
+      </p:grpSp>
+      <p:grpSp>
+        <p:nvGrpSpPr>
+          <p:cNvPr id="27" name="Gruppieren 26">
+            <a:extLst>
+              <a:ext uri="{FF2B5EF4-FFF2-40B4-BE49-F238E27FC236}">
+                <a16:creationId xmlns:a16="http://schemas.microsoft.com/office/drawing/2014/main" id="{60F82060-7562-8F29-7CAD-59ECFD5DC96B}"/>
+              </a:ext>
+            </a:extLst>
+          </p:cNvPr>
+          <p:cNvGrpSpPr/>
+          <p:nvPr/>
+        </p:nvGrpSpPr>
+        <p:grpSpPr>
+          <a:xfrm>
+            <a:off x="838200" y="1843770"/>
+            <a:ext cx="9276100" cy="1091543"/>
+            <a:chOff x="838200" y="1843770"/>
+            <a:chExt cx="9276100" cy="1091543"/>
+          </a:xfrm>
+        </p:grpSpPr>
+        <p:grpSp>
+          <p:nvGrpSpPr>
+            <p:cNvPr id="7" name="Gruppieren 6">
+              <a:extLst>
+                <a:ext uri="{FF2B5EF4-FFF2-40B4-BE49-F238E27FC236}">
+                  <a16:creationId xmlns:a16="http://schemas.microsoft.com/office/drawing/2014/main" id="{C866714F-8DA8-F870-AB52-9EFFA7E74DD0}"/>
+                </a:ext>
+              </a:extLst>
+            </p:cNvPr>
+            <p:cNvGrpSpPr/>
+            <p:nvPr/>
+          </p:nvGrpSpPr>
+          <p:grpSpPr>
+            <a:xfrm>
+              <a:off x="838200" y="1920087"/>
+              <a:ext cx="6566237" cy="929721"/>
+              <a:chOff x="838200" y="1920087"/>
+              <a:chExt cx="6566237" cy="929721"/>
+            </a:xfrm>
+          </p:grpSpPr>
+          <p:sp>
+            <p:nvSpPr>
+              <p:cNvPr id="4" name="Textfeld 3">
+                <a:extLst>
+                  <a:ext uri="{FF2B5EF4-FFF2-40B4-BE49-F238E27FC236}">
+                    <a16:creationId xmlns:a16="http://schemas.microsoft.com/office/drawing/2014/main" id="{D4DA9E38-4EDC-C994-B529-6C2454262E02}"/>
+                  </a:ext>
+                </a:extLst>
+              </p:cNvPr>
+              <p:cNvSpPr txBox="1"/>
+              <p:nvPr/>
+            </p:nvSpPr>
+            <p:spPr>
+              <a:xfrm>
+                <a:off x="838200" y="2095436"/>
+                <a:ext cx="2264018" cy="523220"/>
+              </a:xfrm>
+              <a:prstGeom prst="rect">
+                <a:avLst/>
+              </a:prstGeom>
+              <a:noFill/>
+            </p:spPr>
+            <p:txBody>
+              <a:bodyPr wrap="none" rtlCol="0">
+                <a:spAutoFit/>
+              </a:bodyPr>
+              <a:lstStyle/>
+              <a:p>
+                <a:pPr marL="457200" indent="-457200">
+                  <a:spcAft>
+                    <a:spcPts val="3600"/>
+                  </a:spcAft>
+                  <a:buAutoNum type="arabicParenR"/>
+                </a:pPr>
+                <a:r>
+                  <a:rPr lang="de-DE" sz="2800" b="1"/>
+                  <a:t>IDS-</a:t>
+                </a:r>
+                <a:r>
+                  <a:rPr lang="de-DE" sz="2800" b="1" err="1"/>
+                  <a:t>Fetch</a:t>
+                </a:r>
+                <a:endParaRPr lang="de-DE" sz="2800" b="1"/>
+              </a:p>
+            </p:txBody>
+          </p:sp>
+          <p:pic>
+            <p:nvPicPr>
+              <p:cNvPr id="5" name="Grafik 4">
+                <a:extLst>
+                  <a:ext uri="{FF2B5EF4-FFF2-40B4-BE49-F238E27FC236}">
+                    <a16:creationId xmlns:a16="http://schemas.microsoft.com/office/drawing/2014/main" id="{7C60A857-967E-74F6-84AD-18956B785695}"/>
+                  </a:ext>
+                </a:extLst>
+              </p:cNvPr>
+              <p:cNvPicPr>
+                <a:picLocks noChangeAspect="1"/>
+              </p:cNvPicPr>
+              <p:nvPr/>
+            </p:nvPicPr>
+            <p:blipFill>
+              <a:blip r:embed="rId8"/>
+              <a:stretch>
+                <a:fillRect/>
+              </a:stretch>
+            </p:blipFill>
+            <p:spPr>
+              <a:xfrm>
+                <a:off x="3442423" y="1920087"/>
+                <a:ext cx="2575783" cy="929721"/>
+              </a:xfrm>
+              <a:prstGeom prst="rect">
+                <a:avLst/>
+              </a:prstGeom>
+            </p:spPr>
+          </p:pic>
+          <p:pic>
+            <p:nvPicPr>
+              <p:cNvPr id="6" name="Grafik 5">
+                <a:extLst>
+                  <a:ext uri="{FF2B5EF4-FFF2-40B4-BE49-F238E27FC236}">
+                    <a16:creationId xmlns:a16="http://schemas.microsoft.com/office/drawing/2014/main" id="{F657F439-1C95-5F9D-D5A2-5E4C66AE9D63}"/>
+                  </a:ext>
+                </a:extLst>
+              </p:cNvPr>
+              <p:cNvPicPr>
+                <a:picLocks noChangeAspect="1"/>
+              </p:cNvPicPr>
+              <p:nvPr/>
+            </p:nvPicPr>
+            <p:blipFill>
+              <a:blip r:embed="rId6"/>
+              <a:stretch>
+                <a:fillRect/>
+              </a:stretch>
+            </p:blipFill>
+            <p:spPr>
+              <a:xfrm>
+                <a:off x="6280605" y="2189726"/>
+                <a:ext cx="1123832" cy="253413"/>
+              </a:xfrm>
+              <a:prstGeom prst="rect">
+                <a:avLst/>
+              </a:prstGeom>
+            </p:spPr>
+          </p:pic>
+        </p:grpSp>
+        <p:pic>
+          <p:nvPicPr>
+            <p:cNvPr id="26" name="Grafik 25">
+              <a:extLst>
+                <a:ext uri="{FF2B5EF4-FFF2-40B4-BE49-F238E27FC236}">
+                  <a16:creationId xmlns:a16="http://schemas.microsoft.com/office/drawing/2014/main" id="{61EFFE90-4F4E-50AD-4966-BEE04AA17E5F}"/>
+                </a:ext>
+              </a:extLst>
+            </p:cNvPr>
+            <p:cNvPicPr>
+              <a:picLocks noChangeAspect="1"/>
+            </p:cNvPicPr>
+            <p:nvPr/>
+          </p:nvPicPr>
+          <p:blipFill>
+            <a:blip r:embed="rId9"/>
+            <a:stretch>
+              <a:fillRect/>
+            </a:stretch>
+          </p:blipFill>
+          <p:spPr>
+            <a:xfrm>
+              <a:off x="7617877" y="1843770"/>
+              <a:ext cx="2496423" cy="1091543"/>
+            </a:xfrm>
+            <a:prstGeom prst="rect">
+              <a:avLst/>
+            </a:prstGeom>
+          </p:spPr>
+        </p:pic>
+      </p:grpSp>
+      <p:sp>
+        <p:nvSpPr>
+          <p:cNvPr id="8" name="Textfeld 7">
+            <a:extLst>
+              <a:ext uri="{FF2B5EF4-FFF2-40B4-BE49-F238E27FC236}">
+                <a16:creationId xmlns:a16="http://schemas.microsoft.com/office/drawing/2014/main" id="{7285870E-A0C2-B641-C857-A5679E9D7552}"/>
+              </a:ext>
+            </a:extLst>
+          </p:cNvPr>
+          <p:cNvSpPr txBox="1"/>
+          <p:nvPr/>
+        </p:nvSpPr>
+        <p:spPr>
+          <a:xfrm>
+            <a:off x="3390868" y="6492875"/>
+            <a:ext cx="5823004" cy="276999"/>
+          </a:xfrm>
+          <a:prstGeom prst="rect">
+            <a:avLst/>
+          </a:prstGeom>
+          <a:noFill/>
+        </p:spPr>
+        <p:txBody>
+          <a:bodyPr wrap="none" rtlCol="0">
+            <a:spAutoFit/>
+          </a:bodyPr>
+          <a:lstStyle/>
+          <a:p>
+            <a:r>
+              <a:rPr lang="de-DE" sz="1200"/>
+              <a:t>Team Bonsai (Krieger, Weise, Gmeiner) – Hackathon zum BIM-Portal des Bundes 2025</a:t>
+            </a:r>
+          </a:p>
+        </p:txBody>
+      </p:sp>
+    </p:spTree>
+    <p:extLst>
+      <p:ext uri="{BB962C8B-B14F-4D97-AF65-F5344CB8AC3E}">
+        <p14:creationId xmlns:p14="http://schemas.microsoft.com/office/powerpoint/2010/main" val="3819873198"/>
+      </p:ext>
+    </p:extLst>
+  </p:cSld>
+  <p:clrMapOvr>
+    <a:masterClrMapping/>
+  </p:clrMapOvr>
+  <p:timing>
+    <p:tnLst>
+      <p:par>
+        <p:cTn id="1" dur="indefinite" restart="never" nodeType="tmRoot">
+          <p:childTnLst>
+            <p:seq concurrent="1" nextAc="seek">
+              <p:cTn id="2" dur="indefinite" nodeType="mainSeq">
+                <p:childTnLst>
+                  <p:par>
+                    <p:cTn id="3" fill="hold">
+                      <p:stCondLst>
+                        <p:cond delay="indefinite"/>
+                      </p:stCondLst>
+                      <p:childTnLst>
+                        <p:par>
+                          <p:cTn id="4" fill="hold">
+                            <p:stCondLst>
+                              <p:cond delay="0"/>
+                            </p:stCondLst>
+                            <p:childTnLst>
+                              <p:par>
+                                <p:cTn id="5" presetID="22" presetClass="entr" presetSubtype="8" fill="hold" nodeType="clickEffect">
+                                  <p:stCondLst>
+                                    <p:cond delay="0"/>
+                                  </p:stCondLst>
+                                  <p:childTnLst>
+                                    <p:set>
+                                      <p:cBhvr>
+                                        <p:cTn id="6" dur="1" fill="hold">
+                                          <p:stCondLst>
+                                            <p:cond delay="0"/>
+                                          </p:stCondLst>
+                                        </p:cTn>
+                                        <p:tgtEl>
+                                          <p:spTgt spid="27"/>
+                                        </p:tgtEl>
+                                        <p:attrNameLst>
+                                          <p:attrName>style.visibility</p:attrName>
+                                        </p:attrNameLst>
+                                      </p:cBhvr>
+                                      <p:to>
+                                        <p:strVal val="visible"/>
+                                      </p:to>
+                                    </p:set>
+                                    <p:animEffect transition="in" filter="wipe(left)">
+                                      <p:cBhvr>
+                                        <p:cTn id="7" dur="500"/>
+                                        <p:tgtEl>
+                                          <p:spTgt spid="27"/>
+                                        </p:tgtEl>
+                                      </p:cBhvr>
+                                    </p:animEffect>
+                                  </p:childTnLst>
+                                </p:cTn>
+                              </p:par>
+                            </p:childTnLst>
+                          </p:cTn>
+                        </p:par>
+                      </p:childTnLst>
+                    </p:cTn>
+                  </p:par>
+                  <p:par>
+                    <p:cTn id="8" fill="hold">
+                      <p:stCondLst>
+                        <p:cond delay="indefinite"/>
+                      </p:stCondLst>
+                      <p:childTnLst>
+                        <p:par>
+                          <p:cTn id="9" fill="hold">
+                            <p:stCondLst>
+                              <p:cond delay="0"/>
+                            </p:stCondLst>
+                            <p:childTnLst>
+                              <p:par>
+                                <p:cTn id="10" presetID="22" presetClass="entr" presetSubtype="8" fill="hold" nodeType="clickEffect">
+                                  <p:stCondLst>
+                                    <p:cond delay="0"/>
+                                  </p:stCondLst>
+                                  <p:childTnLst>
+                                    <p:set>
+                                      <p:cBhvr>
+                                        <p:cTn id="11" dur="1" fill="hold">
+                                          <p:stCondLst>
+                                            <p:cond delay="0"/>
+                                          </p:stCondLst>
+                                        </p:cTn>
+                                        <p:tgtEl>
+                                          <p:spTgt spid="3"/>
+                                        </p:tgtEl>
+                                        <p:attrNameLst>
+                                          <p:attrName>style.visibility</p:attrName>
+                                        </p:attrNameLst>
+                                      </p:cBhvr>
+                                      <p:to>
+                                        <p:strVal val="visible"/>
+                                      </p:to>
+                                    </p:set>
+                                    <p:animEffect transition="in" filter="wipe(left)">
+                                      <p:cBhvr>
+                                        <p:cTn id="12" dur="500"/>
+                                        <p:tgtEl>
+                                          <p:spTgt spid="3"/>
+                                        </p:tgtEl>
+                                      </p:cBhvr>
+                                    </p:animEffect>
+                                  </p:childTnLst>
+                                </p:cTn>
+                              </p:par>
+                            </p:childTnLst>
+                          </p:cTn>
+                        </p:par>
+                      </p:childTnLst>
+                    </p:cTn>
+                  </p:par>
+                  <p:par>
+                    <p:cTn id="13" fill="hold">
+                      <p:stCondLst>
+                        <p:cond delay="indefinite"/>
+                      </p:stCondLst>
+                      <p:childTnLst>
+                        <p:par>
+                          <p:cTn id="14" fill="hold">
+                            <p:stCondLst>
+                              <p:cond delay="0"/>
+                            </p:stCondLst>
+                            <p:childTnLst>
+                              <p:par>
+                                <p:cTn id="15" presetID="22" presetClass="entr" presetSubtype="2" fill="hold" nodeType="clickEffect">
+                                  <p:stCondLst>
+                                    <p:cond delay="0"/>
+                                  </p:stCondLst>
+                                  <p:childTnLst>
+                                    <p:set>
+                                      <p:cBhvr>
+                                        <p:cTn id="16" dur="1" fill="hold">
+                                          <p:stCondLst>
+                                            <p:cond delay="0"/>
+                                          </p:stCondLst>
+                                        </p:cTn>
+                                        <p:tgtEl>
+                                          <p:spTgt spid="31"/>
+                                        </p:tgtEl>
+                                        <p:attrNameLst>
+                                          <p:attrName>style.visibility</p:attrName>
+                                        </p:attrNameLst>
+                                      </p:cBhvr>
+                                      <p:to>
+                                        <p:strVal val="visible"/>
+                                      </p:to>
+                                    </p:set>
+                                    <p:animEffect transition="in" filter="wipe(right)">
+                                      <p:cBhvr>
+                                        <p:cTn id="17" dur="500"/>
+                                        <p:tgtEl>
+                                          <p:spTgt spid="31"/>
+                                        </p:tgtEl>
+                                      </p:cBhvr>
+                                    </p:animEffect>
+                                  </p:childTnLst>
+                                </p:cTn>
+                              </p:par>
+                            </p:childTnLst>
+                          </p:cTn>
+                        </p:par>
+                      </p:childTnLst>
+                    </p:cTn>
+                  </p:par>
+                </p:childTnLst>
+              </p:cTn>
+              <p:prevCondLst>
+                <p:cond evt="onPrev" delay="0">
+                  <p:tgtEl>
+                    <p:sldTgt/>
+                  </p:tgtEl>
+                </p:cond>
+              </p:prevCondLst>
+              <p:nextCondLst>
+                <p:cond evt="onNext" delay="0">
+                  <p:tgtEl>
+                    <p:sldTgt/>
+                  </p:tgtEl>
+                </p:cond>
+              </p:nextCondLst>
+            </p:seq>
+          </p:childTnLst>
+        </p:cTn>
+      </p:par>
+    </p:tnLst>
+  </p:timing>
+</p:sld>
+</file>
+
+<file path=ppt/slides/slide8.xml><?xml version="1.0" encoding="utf-8"?>
 <p:sld xmlns:a="http://schemas.openxmlformats.org/drawingml/2006/main" xmlns:r="http://schemas.openxmlformats.org/officeDocument/2006/relationships" xmlns:p="http://schemas.openxmlformats.org/presentationml/2006/main">
   <p:cSld>
     <p:spTree>
@@ -7680,7 +10368,7 @@
 </p:sld>
 </file>
 
-<file path=ppt/slides/slide7.xml><?xml version="1.0" encoding="utf-8"?>
+<file path=ppt/slides/slide9.xml><?xml version="1.0" encoding="utf-8"?>
 <p:sld xmlns:a="http://schemas.openxmlformats.org/drawingml/2006/main" xmlns:r="http://schemas.openxmlformats.org/officeDocument/2006/relationships" xmlns:p="http://schemas.openxmlformats.org/presentationml/2006/main">
   <p:cSld>
     <p:spTree>
@@ -8157,730 +10845,6 @@
                                         <p:cTn id="7" dur="500"/>
                                         <p:tgtEl>
                                           <p:spTgt spid="15"/>
-                                        </p:tgtEl>
-                                      </p:cBhvr>
-                                    </p:animEffect>
-                                  </p:childTnLst>
-                                </p:cTn>
-                              </p:par>
-                            </p:childTnLst>
-                          </p:cTn>
-                        </p:par>
-                      </p:childTnLst>
-                    </p:cTn>
-                  </p:par>
-                </p:childTnLst>
-              </p:cTn>
-              <p:prevCondLst>
-                <p:cond evt="onPrev" delay="0">
-                  <p:tgtEl>
-                    <p:sldTgt/>
-                  </p:tgtEl>
-                </p:cond>
-              </p:prevCondLst>
-              <p:nextCondLst>
-                <p:cond evt="onNext" delay="0">
-                  <p:tgtEl>
-                    <p:sldTgt/>
-                  </p:tgtEl>
-                </p:cond>
-              </p:nextCondLst>
-            </p:seq>
-          </p:childTnLst>
-        </p:cTn>
-      </p:par>
-    </p:tnLst>
-  </p:timing>
-</p:sld>
-</file>
-
-<file path=ppt/slides/slide8.xml><?xml version="1.0" encoding="utf-8"?>
-<p:sld xmlns:a="http://schemas.openxmlformats.org/drawingml/2006/main" xmlns:r="http://schemas.openxmlformats.org/officeDocument/2006/relationships" xmlns:p="http://schemas.openxmlformats.org/presentationml/2006/main">
-  <p:cSld>
-    <p:spTree>
-      <p:nvGrpSpPr>
-        <p:cNvPr id="1" name="">
-          <a:extLst>
-            <a:ext uri="{FF2B5EF4-FFF2-40B4-BE49-F238E27FC236}">
-              <a16:creationId xmlns:a16="http://schemas.microsoft.com/office/drawing/2014/main" id="{DB32A4A0-D9FA-510C-1BFA-A16405EFBBAF}"/>
-            </a:ext>
-          </a:extLst>
-        </p:cNvPr>
-        <p:cNvGrpSpPr/>
-        <p:nvPr/>
-      </p:nvGrpSpPr>
-      <p:grpSpPr>
-        <a:xfrm>
-          <a:off x="0" y="0"/>
-          <a:ext cx="0" cy="0"/>
-          <a:chOff x="0" y="0"/>
-          <a:chExt cx="0" cy="0"/>
-        </a:xfrm>
-      </p:grpSpPr>
-      <p:sp>
-        <p:nvSpPr>
-          <p:cNvPr id="2" name="Titel 1">
-            <a:extLst>
-              <a:ext uri="{FF2B5EF4-FFF2-40B4-BE49-F238E27FC236}">
-                <a16:creationId xmlns:a16="http://schemas.microsoft.com/office/drawing/2014/main" id="{0A6435A3-0ECE-4757-1AD2-596A36112E94}"/>
-              </a:ext>
-            </a:extLst>
-          </p:cNvPr>
-          <p:cNvSpPr>
-            <a:spLocks noGrp="1"/>
-          </p:cNvSpPr>
-          <p:nvPr>
-            <p:ph type="title"/>
-          </p:nvPr>
-        </p:nvSpPr>
-        <p:spPr/>
-        <p:txBody>
-          <a:bodyPr/>
-          <a:lstStyle/>
-          <a:p>
-            <a:r>
-              <a:rPr lang="de-DE" sz="4000" b="1"/>
-              <a:t>Screenshots</a:t>
-            </a:r>
-          </a:p>
-        </p:txBody>
-      </p:sp>
-      <p:sp>
-        <p:nvSpPr>
-          <p:cNvPr id="20" name="Textfeld 19">
-            <a:extLst>
-              <a:ext uri="{FF2B5EF4-FFF2-40B4-BE49-F238E27FC236}">
-                <a16:creationId xmlns:a16="http://schemas.microsoft.com/office/drawing/2014/main" id="{4D550499-D077-87A5-10B6-8C0E1549194A}"/>
-              </a:ext>
-            </a:extLst>
-          </p:cNvPr>
-          <p:cNvSpPr txBox="1"/>
-          <p:nvPr/>
-        </p:nvSpPr>
-        <p:spPr>
-          <a:xfrm>
-            <a:off x="871443" y="1352461"/>
-            <a:ext cx="1320874" cy="400110"/>
-          </a:xfrm>
-          <a:prstGeom prst="rect">
-            <a:avLst/>
-          </a:prstGeom>
-          <a:noFill/>
-        </p:spPr>
-        <p:txBody>
-          <a:bodyPr wrap="none" rtlCol="0">
-            <a:spAutoFit/>
-          </a:bodyPr>
-          <a:lstStyle/>
-          <a:p>
-            <a:r>
-              <a:rPr lang="de-DE" sz="2000"/>
-              <a:t>IDS Match</a:t>
-            </a:r>
-          </a:p>
-        </p:txBody>
-      </p:sp>
-      <p:sp>
-        <p:nvSpPr>
-          <p:cNvPr id="3" name="Textfeld 2">
-            <a:extLst>
-              <a:ext uri="{FF2B5EF4-FFF2-40B4-BE49-F238E27FC236}">
-                <a16:creationId xmlns:a16="http://schemas.microsoft.com/office/drawing/2014/main" id="{8A3ABBCE-CCBF-9DFE-D8EE-7165494B0112}"/>
-              </a:ext>
-            </a:extLst>
-          </p:cNvPr>
-          <p:cNvSpPr txBox="1"/>
-          <p:nvPr/>
-        </p:nvSpPr>
-        <p:spPr>
-          <a:xfrm>
-            <a:off x="3390868" y="6492875"/>
-            <a:ext cx="5410264" cy="338554"/>
-          </a:xfrm>
-          <a:prstGeom prst="rect">
-            <a:avLst/>
-          </a:prstGeom>
-          <a:noFill/>
-        </p:spPr>
-        <p:txBody>
-          <a:bodyPr wrap="none" rtlCol="0">
-            <a:spAutoFit/>
-          </a:bodyPr>
-          <a:lstStyle/>
-          <a:p>
-            <a:r>
-              <a:rPr lang="de-DE" sz="1600"/>
-              <a:t>Team Bonsai – Hackathon zum BIM-Portal des Bundes 2025</a:t>
-            </a:r>
-          </a:p>
-        </p:txBody>
-      </p:sp>
-      <p:grpSp>
-        <p:nvGrpSpPr>
-          <p:cNvPr id="6" name="Gruppieren 5">
-            <a:extLst>
-              <a:ext uri="{FF2B5EF4-FFF2-40B4-BE49-F238E27FC236}">
-                <a16:creationId xmlns:a16="http://schemas.microsoft.com/office/drawing/2014/main" id="{F4C3C30E-665A-F113-8AEA-4DF6FF4E6CE3}"/>
-              </a:ext>
-            </a:extLst>
-          </p:cNvPr>
-          <p:cNvGrpSpPr/>
-          <p:nvPr/>
-        </p:nvGrpSpPr>
-        <p:grpSpPr>
-          <a:xfrm>
-            <a:off x="962145" y="-460092"/>
-            <a:ext cx="10923922" cy="6891278"/>
-            <a:chOff x="962145" y="-460092"/>
-            <a:chExt cx="10923922" cy="6891278"/>
-          </a:xfrm>
-        </p:grpSpPr>
-        <p:pic>
-          <p:nvPicPr>
-            <p:cNvPr id="2050" name="Picture 2">
-              <a:extLst>
-                <a:ext uri="{FF2B5EF4-FFF2-40B4-BE49-F238E27FC236}">
-                  <a16:creationId xmlns:a16="http://schemas.microsoft.com/office/drawing/2014/main" id="{A6E2180C-7D43-D8E5-0B3D-E43AF38D8FCC}"/>
-                </a:ext>
-              </a:extLst>
-            </p:cNvPr>
-            <p:cNvPicPr>
-              <a:picLocks noChangeAspect="1" noChangeArrowheads="1"/>
-            </p:cNvPicPr>
-            <p:nvPr/>
-          </p:nvPicPr>
-          <p:blipFill>
-            <a:blip r:embed="rId3">
-              <a:extLst>
-                <a:ext uri="{28A0092B-C50C-407E-A947-70E740481C1C}">
-                  <a14:useLocalDpi xmlns:a14="http://schemas.microsoft.com/office/drawing/2010/main" val="0"/>
-                </a:ext>
-              </a:extLst>
-            </a:blip>
-            <a:srcRect/>
-            <a:stretch>
-              <a:fillRect/>
-            </a:stretch>
-          </p:blipFill>
-          <p:spPr bwMode="auto">
-            <a:xfrm>
-              <a:off x="4438743" y="1752571"/>
-              <a:ext cx="3587638" cy="4678615"/>
-            </a:xfrm>
-            <a:prstGeom prst="rect">
-              <a:avLst/>
-            </a:prstGeom>
-            <a:noFill/>
-            <a:extLst>
-              <a:ext uri="{909E8E84-426E-40DD-AFC4-6F175D3DCCD1}">
-                <a14:hiddenFill xmlns:a14="http://schemas.microsoft.com/office/drawing/2010/main">
-                  <a:solidFill>
-                    <a:srgbClr val="FFFFFF"/>
-                  </a:solidFill>
-                </a14:hiddenFill>
-              </a:ext>
-            </a:extLst>
-          </p:spPr>
-        </p:pic>
-        <p:pic>
-          <p:nvPicPr>
-            <p:cNvPr id="3074" name="Picture 2">
-              <a:extLst>
-                <a:ext uri="{FF2B5EF4-FFF2-40B4-BE49-F238E27FC236}">
-                  <a16:creationId xmlns:a16="http://schemas.microsoft.com/office/drawing/2014/main" id="{A688A624-7E8A-FFD7-D517-62D99AD05D57}"/>
-                </a:ext>
-              </a:extLst>
-            </p:cNvPr>
-            <p:cNvPicPr>
-              <a:picLocks noChangeAspect="1" noChangeArrowheads="1"/>
-            </p:cNvPicPr>
-            <p:nvPr/>
-          </p:nvPicPr>
-          <p:blipFill rotWithShape="1">
-            <a:blip r:embed="rId4">
-              <a:extLst>
-                <a:ext uri="{28A0092B-C50C-407E-A947-70E740481C1C}">
-                  <a14:useLocalDpi xmlns:a14="http://schemas.microsoft.com/office/drawing/2010/main" val="0"/>
-                </a:ext>
-              </a:extLst>
-            </a:blip>
-            <a:srcRect t="-27782" b="27782"/>
-            <a:stretch>
-              <a:fillRect/>
-            </a:stretch>
-          </p:blipFill>
-          <p:spPr bwMode="auto">
-            <a:xfrm>
-              <a:off x="8224086" y="-460092"/>
-              <a:ext cx="3661981" cy="6891278"/>
-            </a:xfrm>
-            <a:prstGeom prst="rect">
-              <a:avLst/>
-            </a:prstGeom>
-            <a:noFill/>
-            <a:extLst>
-              <a:ext uri="{909E8E84-426E-40DD-AFC4-6F175D3DCCD1}">
-                <a14:hiddenFill xmlns:a14="http://schemas.microsoft.com/office/drawing/2010/main">
-                  <a:solidFill>
-                    <a:srgbClr val="FFFFFF"/>
-                  </a:solidFill>
-                </a14:hiddenFill>
-              </a:ext>
-            </a:extLst>
-          </p:spPr>
-        </p:pic>
-        <p:pic>
-          <p:nvPicPr>
-            <p:cNvPr id="3076" name="Picture 4">
-              <a:extLst>
-                <a:ext uri="{FF2B5EF4-FFF2-40B4-BE49-F238E27FC236}">
-                  <a16:creationId xmlns:a16="http://schemas.microsoft.com/office/drawing/2014/main" id="{82F92113-2B95-1542-AAD6-2EA45E482785}"/>
-                </a:ext>
-              </a:extLst>
-            </p:cNvPr>
-            <p:cNvPicPr>
-              <a:picLocks noChangeAspect="1" noChangeArrowheads="1"/>
-            </p:cNvPicPr>
-            <p:nvPr/>
-          </p:nvPicPr>
-          <p:blipFill>
-            <a:blip r:embed="rId5">
-              <a:extLst>
-                <a:ext uri="{28A0092B-C50C-407E-A947-70E740481C1C}">
-                  <a14:useLocalDpi xmlns:a14="http://schemas.microsoft.com/office/drawing/2010/main" val="0"/>
-                </a:ext>
-              </a:extLst>
-            </a:blip>
-            <a:srcRect/>
-            <a:stretch>
-              <a:fillRect/>
-            </a:stretch>
-          </p:blipFill>
-          <p:spPr bwMode="auto">
-            <a:xfrm>
-              <a:off x="962145" y="1814260"/>
-              <a:ext cx="3276600" cy="2038350"/>
-            </a:xfrm>
-            <a:prstGeom prst="rect">
-              <a:avLst/>
-            </a:prstGeom>
-            <a:noFill/>
-            <a:extLst>
-              <a:ext uri="{909E8E84-426E-40DD-AFC4-6F175D3DCCD1}">
-                <a14:hiddenFill xmlns:a14="http://schemas.microsoft.com/office/drawing/2010/main">
-                  <a:solidFill>
-                    <a:srgbClr val="FFFFFF"/>
-                  </a:solidFill>
-                </a14:hiddenFill>
-              </a:ext>
-            </a:extLst>
-          </p:spPr>
-        </p:pic>
-      </p:grpSp>
-    </p:spTree>
-    <p:extLst>
-      <p:ext uri="{BB962C8B-B14F-4D97-AF65-F5344CB8AC3E}">
-        <p14:creationId xmlns:p14="http://schemas.microsoft.com/office/powerpoint/2010/main" val="1706552454"/>
-      </p:ext>
-    </p:extLst>
-  </p:cSld>
-  <p:clrMapOvr>
-    <a:masterClrMapping/>
-  </p:clrMapOvr>
-  <p:timing>
-    <p:tnLst>
-      <p:par>
-        <p:cTn id="1" dur="indefinite" restart="never" nodeType="tmRoot">
-          <p:childTnLst>
-            <p:seq concurrent="1" nextAc="seek">
-              <p:cTn id="2" dur="indefinite" nodeType="mainSeq">
-                <p:childTnLst>
-                  <p:par>
-                    <p:cTn id="3" fill="hold">
-                      <p:stCondLst>
-                        <p:cond delay="indefinite"/>
-                        <p:cond evt="onBegin" delay="0">
-                          <p:tn val="2"/>
-                        </p:cond>
-                      </p:stCondLst>
-                      <p:childTnLst>
-                        <p:par>
-                          <p:cTn id="4" fill="hold">
-                            <p:stCondLst>
-                              <p:cond delay="0"/>
-                            </p:stCondLst>
-                            <p:childTnLst>
-                              <p:par>
-                                <p:cTn id="5" presetID="22" presetClass="entr" presetSubtype="8" fill="hold" nodeType="withEffect">
-                                  <p:stCondLst>
-                                    <p:cond delay="0"/>
-                                  </p:stCondLst>
-                                  <p:childTnLst>
-                                    <p:set>
-                                      <p:cBhvr>
-                                        <p:cTn id="6" dur="1" fill="hold">
-                                          <p:stCondLst>
-                                            <p:cond delay="0"/>
-                                          </p:stCondLst>
-                                        </p:cTn>
-                                        <p:tgtEl>
-                                          <p:spTgt spid="6"/>
-                                        </p:tgtEl>
-                                        <p:attrNameLst>
-                                          <p:attrName>style.visibility</p:attrName>
-                                        </p:attrNameLst>
-                                      </p:cBhvr>
-                                      <p:to>
-                                        <p:strVal val="visible"/>
-                                      </p:to>
-                                    </p:set>
-                                    <p:animEffect transition="in" filter="wipe(left)">
-                                      <p:cBhvr>
-                                        <p:cTn id="7" dur="500"/>
-                                        <p:tgtEl>
-                                          <p:spTgt spid="6"/>
-                                        </p:tgtEl>
-                                      </p:cBhvr>
-                                    </p:animEffect>
-                                  </p:childTnLst>
-                                </p:cTn>
-                              </p:par>
-                            </p:childTnLst>
-                          </p:cTn>
-                        </p:par>
-                      </p:childTnLst>
-                    </p:cTn>
-                  </p:par>
-                </p:childTnLst>
-              </p:cTn>
-              <p:prevCondLst>
-                <p:cond evt="onPrev" delay="0">
-                  <p:tgtEl>
-                    <p:sldTgt/>
-                  </p:tgtEl>
-                </p:cond>
-              </p:prevCondLst>
-              <p:nextCondLst>
-                <p:cond evt="onNext" delay="0">
-                  <p:tgtEl>
-                    <p:sldTgt/>
-                  </p:tgtEl>
-                </p:cond>
-              </p:nextCondLst>
-            </p:seq>
-          </p:childTnLst>
-        </p:cTn>
-      </p:par>
-    </p:tnLst>
-  </p:timing>
-</p:sld>
-</file>
-
-<file path=ppt/slides/slide9.xml><?xml version="1.0" encoding="utf-8"?>
-<p:sld xmlns:a="http://schemas.openxmlformats.org/drawingml/2006/main" xmlns:r="http://schemas.openxmlformats.org/officeDocument/2006/relationships" xmlns:p="http://schemas.openxmlformats.org/presentationml/2006/main">
-  <p:cSld>
-    <p:spTree>
-      <p:nvGrpSpPr>
-        <p:cNvPr id="1" name="">
-          <a:extLst>
-            <a:ext uri="{FF2B5EF4-FFF2-40B4-BE49-F238E27FC236}">
-              <a16:creationId xmlns:a16="http://schemas.microsoft.com/office/drawing/2014/main" id="{0011C7C3-90FB-77EE-254C-E021AE7053F1}"/>
-            </a:ext>
-          </a:extLst>
-        </p:cNvPr>
-        <p:cNvGrpSpPr/>
-        <p:nvPr/>
-      </p:nvGrpSpPr>
-      <p:grpSpPr>
-        <a:xfrm>
-          <a:off x="0" y="0"/>
-          <a:ext cx="0" cy="0"/>
-          <a:chOff x="0" y="0"/>
-          <a:chExt cx="0" cy="0"/>
-        </a:xfrm>
-      </p:grpSpPr>
-      <p:sp>
-        <p:nvSpPr>
-          <p:cNvPr id="2" name="Titel 1">
-            <a:extLst>
-              <a:ext uri="{FF2B5EF4-FFF2-40B4-BE49-F238E27FC236}">
-                <a16:creationId xmlns:a16="http://schemas.microsoft.com/office/drawing/2014/main" id="{FE89AE42-D216-F624-4C71-6BC7FA20C5C1}"/>
-              </a:ext>
-            </a:extLst>
-          </p:cNvPr>
-          <p:cNvSpPr>
-            <a:spLocks noGrp="1"/>
-          </p:cNvSpPr>
-          <p:nvPr>
-            <p:ph type="title"/>
-          </p:nvPr>
-        </p:nvSpPr>
-        <p:spPr/>
-        <p:txBody>
-          <a:bodyPr/>
-          <a:lstStyle/>
-          <a:p>
-            <a:r>
-              <a:rPr lang="de-DE" sz="4000" b="1"/>
-              <a:t>Screenshots</a:t>
-            </a:r>
-          </a:p>
-        </p:txBody>
-      </p:sp>
-      <p:sp>
-        <p:nvSpPr>
-          <p:cNvPr id="20" name="Textfeld 19">
-            <a:extLst>
-              <a:ext uri="{FF2B5EF4-FFF2-40B4-BE49-F238E27FC236}">
-                <a16:creationId xmlns:a16="http://schemas.microsoft.com/office/drawing/2014/main" id="{360C7006-2BB7-A333-D9B5-0A23C9BDF70C}"/>
-              </a:ext>
-            </a:extLst>
-          </p:cNvPr>
-          <p:cNvSpPr txBox="1"/>
-          <p:nvPr/>
-        </p:nvSpPr>
-        <p:spPr>
-          <a:xfrm>
-            <a:off x="871443" y="1352461"/>
-            <a:ext cx="1246816" cy="400110"/>
-          </a:xfrm>
-          <a:prstGeom prst="rect">
-            <a:avLst/>
-          </a:prstGeom>
-          <a:noFill/>
-        </p:spPr>
-        <p:txBody>
-          <a:bodyPr wrap="none" rtlCol="0">
-            <a:spAutoFit/>
-          </a:bodyPr>
-          <a:lstStyle/>
-          <a:p>
-            <a:r>
-              <a:rPr lang="de-DE" sz="2000"/>
-              <a:t>IFC Patch</a:t>
-            </a:r>
-          </a:p>
-        </p:txBody>
-      </p:sp>
-      <p:sp>
-        <p:nvSpPr>
-          <p:cNvPr id="3" name="Textfeld 2">
-            <a:extLst>
-              <a:ext uri="{FF2B5EF4-FFF2-40B4-BE49-F238E27FC236}">
-                <a16:creationId xmlns:a16="http://schemas.microsoft.com/office/drawing/2014/main" id="{C03CA85B-6880-2710-C8B3-74044B04B01D}"/>
-              </a:ext>
-            </a:extLst>
-          </p:cNvPr>
-          <p:cNvSpPr txBox="1"/>
-          <p:nvPr/>
-        </p:nvSpPr>
-        <p:spPr>
-          <a:xfrm>
-            <a:off x="3390868" y="6492875"/>
-            <a:ext cx="5410264" cy="338554"/>
-          </a:xfrm>
-          <a:prstGeom prst="rect">
-            <a:avLst/>
-          </a:prstGeom>
-          <a:noFill/>
-        </p:spPr>
-        <p:txBody>
-          <a:bodyPr wrap="none" rtlCol="0">
-            <a:spAutoFit/>
-          </a:bodyPr>
-          <a:lstStyle/>
-          <a:p>
-            <a:r>
-              <a:rPr lang="de-DE" sz="1600"/>
-              <a:t>Team Bonsai – Hackathon zum BIM-Portal des Bundes 2025</a:t>
-            </a:r>
-          </a:p>
-        </p:txBody>
-      </p:sp>
-      <p:grpSp>
-        <p:nvGrpSpPr>
-          <p:cNvPr id="8" name="Gruppieren 7">
-            <a:extLst>
-              <a:ext uri="{FF2B5EF4-FFF2-40B4-BE49-F238E27FC236}">
-                <a16:creationId xmlns:a16="http://schemas.microsoft.com/office/drawing/2014/main" id="{5CF5C93A-42DE-A5A9-1742-1E0FFEC46A6B}"/>
-              </a:ext>
-            </a:extLst>
-          </p:cNvPr>
-          <p:cNvGrpSpPr/>
-          <p:nvPr/>
-        </p:nvGrpSpPr>
-        <p:grpSpPr>
-          <a:xfrm>
-            <a:off x="838200" y="1801898"/>
-            <a:ext cx="10935618" cy="4353972"/>
-            <a:chOff x="838200" y="1801898"/>
-            <a:chExt cx="10935618" cy="4353972"/>
-          </a:xfrm>
-        </p:grpSpPr>
-        <p:pic>
-          <p:nvPicPr>
-            <p:cNvPr id="5" name="Grafik 4">
-              <a:extLst>
-                <a:ext uri="{FF2B5EF4-FFF2-40B4-BE49-F238E27FC236}">
-                  <a16:creationId xmlns:a16="http://schemas.microsoft.com/office/drawing/2014/main" id="{F20ED7DE-D112-6F00-BBC7-6BCB425CC143}"/>
-                </a:ext>
-              </a:extLst>
-            </p:cNvPr>
-            <p:cNvPicPr>
-              <a:picLocks noChangeAspect="1"/>
-            </p:cNvPicPr>
-            <p:nvPr/>
-          </p:nvPicPr>
-          <p:blipFill>
-            <a:blip r:embed="rId3"/>
-            <a:stretch>
-              <a:fillRect/>
-            </a:stretch>
-          </p:blipFill>
-          <p:spPr>
-            <a:xfrm>
-              <a:off x="939591" y="1801898"/>
-              <a:ext cx="4211143" cy="1949107"/>
-            </a:xfrm>
-            <a:prstGeom prst="rect">
-              <a:avLst/>
-            </a:prstGeom>
-          </p:spPr>
-        </p:pic>
-        <p:sp>
-          <p:nvSpPr>
-            <p:cNvPr id="4" name="Textfeld 3">
-              <a:extLst>
-                <a:ext uri="{FF2B5EF4-FFF2-40B4-BE49-F238E27FC236}">
-                  <a16:creationId xmlns:a16="http://schemas.microsoft.com/office/drawing/2014/main" id="{EBD140CE-5C86-108E-6140-3F10CE3777F1}"/>
-                </a:ext>
-              </a:extLst>
-            </p:cNvPr>
-            <p:cNvSpPr txBox="1"/>
-            <p:nvPr/>
-          </p:nvSpPr>
-          <p:spPr>
-            <a:xfrm>
-              <a:off x="838200" y="3800332"/>
-              <a:ext cx="3658502" cy="307777"/>
-            </a:xfrm>
-            <a:prstGeom prst="rect">
-              <a:avLst/>
-            </a:prstGeom>
-            <a:noFill/>
-          </p:spPr>
-          <p:txBody>
-            <a:bodyPr wrap="none" rtlCol="0">
-              <a:spAutoFit/>
-            </a:bodyPr>
-            <a:lstStyle/>
-            <a:p>
-              <a:r>
-                <a:rPr lang="de-DE" sz="1400"/>
-                <a:t>IDS Patch File erstellt durch Match-Extension</a:t>
-              </a:r>
-            </a:p>
-          </p:txBody>
-        </p:sp>
-        <p:pic>
-          <p:nvPicPr>
-            <p:cNvPr id="7" name="Grafik 6">
-              <a:extLst>
-                <a:ext uri="{FF2B5EF4-FFF2-40B4-BE49-F238E27FC236}">
-                  <a16:creationId xmlns:a16="http://schemas.microsoft.com/office/drawing/2014/main" id="{63A28071-D7E8-3333-371A-742758B42D21}"/>
-                </a:ext>
-              </a:extLst>
-            </p:cNvPr>
-            <p:cNvPicPr>
-              <a:picLocks noChangeAspect="1"/>
-            </p:cNvPicPr>
-            <p:nvPr/>
-          </p:nvPicPr>
-          <p:blipFill>
-            <a:blip r:embed="rId4">
-              <a:extLst>
-                <a:ext uri="{28A0092B-C50C-407E-A947-70E740481C1C}">
-                  <a14:useLocalDpi xmlns:a14="http://schemas.microsoft.com/office/drawing/2010/main" val="0"/>
-                </a:ext>
-              </a:extLst>
-            </a:blip>
-            <a:stretch>
-              <a:fillRect/>
-            </a:stretch>
-          </p:blipFill>
-          <p:spPr>
-            <a:xfrm>
-              <a:off x="871443" y="4293607"/>
-              <a:ext cx="10902375" cy="1862263"/>
-            </a:xfrm>
-            <a:prstGeom prst="rect">
-              <a:avLst/>
-            </a:prstGeom>
-          </p:spPr>
-        </p:pic>
-      </p:grpSp>
-    </p:spTree>
-    <p:extLst>
-      <p:ext uri="{BB962C8B-B14F-4D97-AF65-F5344CB8AC3E}">
-        <p14:creationId xmlns:p14="http://schemas.microsoft.com/office/powerpoint/2010/main" val="3019654523"/>
-      </p:ext>
-    </p:extLst>
-  </p:cSld>
-  <p:clrMapOvr>
-    <a:masterClrMapping/>
-  </p:clrMapOvr>
-  <p:timing>
-    <p:tnLst>
-      <p:par>
-        <p:cTn id="1" dur="indefinite" restart="never" nodeType="tmRoot">
-          <p:childTnLst>
-            <p:seq concurrent="1" nextAc="seek">
-              <p:cTn id="2" dur="indefinite" nodeType="mainSeq">
-                <p:childTnLst>
-                  <p:par>
-                    <p:cTn id="3" fill="hold">
-                      <p:stCondLst>
-                        <p:cond delay="indefinite"/>
-                        <p:cond evt="onBegin" delay="0">
-                          <p:tn val="2"/>
-                        </p:cond>
-                      </p:stCondLst>
-                      <p:childTnLst>
-                        <p:par>
-                          <p:cTn id="4" fill="hold">
-                            <p:stCondLst>
-                              <p:cond delay="0"/>
-                            </p:stCondLst>
-                            <p:childTnLst>
-                              <p:par>
-                                <p:cTn id="5" presetID="22" presetClass="entr" presetSubtype="1" fill="hold" nodeType="withEffect">
-                                  <p:stCondLst>
-                                    <p:cond delay="0"/>
-                                  </p:stCondLst>
-                                  <p:childTnLst>
-                                    <p:set>
-                                      <p:cBhvr>
-                                        <p:cTn id="6" dur="1" fill="hold">
-                                          <p:stCondLst>
-                                            <p:cond delay="0"/>
-                                          </p:stCondLst>
-                                        </p:cTn>
-                                        <p:tgtEl>
-                                          <p:spTgt spid="8"/>
-                                        </p:tgtEl>
-                                        <p:attrNameLst>
-                                          <p:attrName>style.visibility</p:attrName>
-                                        </p:attrNameLst>
-                                      </p:cBhvr>
-                                      <p:to>
-                                        <p:strVal val="visible"/>
-                                      </p:to>
-                                    </p:set>
-                                    <p:animEffect transition="in" filter="wipe(up)">
-                                      <p:cBhvr>
-                                        <p:cTn id="7" dur="500"/>
-                                        <p:tgtEl>
-                                          <p:spTgt spid="8"/>
                                         </p:tgtEl>
                                       </p:cBhvr>
                                     </p:animEffect>

</xml_diff>